<commit_message>
Minor text change in presentation
</commit_message>
<xml_diff>
--- a/presentation.pptx
+++ b/presentation.pptx
@@ -1370,7 +1370,7 @@
         </p:nvSpPr>
         <p:spPr>
           <a:xfrm>
-            <a:off x="381300" y="685800"/>
+            <a:off x="381000" y="685800"/>
             <a:ext cx="6096000" cy="3429000"/>
           </a:xfrm>
           <a:custGeom>
@@ -12714,14 +12714,14 @@
               <a:buNone/>
             </a:pPr>
             <a:r>
-              <a:rPr lang="en" sz="1600">
+              <a:rPr lang="en" sz="1600" dirty="0">
                 <a:solidFill>
                   <a:schemeClr val="dk1"/>
                 </a:solidFill>
               </a:rPr>
               <a:t>Instead of passing ownership, we pass a reference to the value.</a:t>
             </a:r>
-            <a:endParaRPr sz="1600">
+            <a:endParaRPr sz="1600" dirty="0">
               <a:solidFill>
                 <a:schemeClr val="dk1"/>
               </a:solidFill>
@@ -12738,7 +12738,7 @@
               <a:buNone/>
             </a:pPr>
             <a:r>
-              <a:rPr lang="en" sz="1600">
+              <a:rPr lang="en" sz="1600" dirty="0">
                 <a:solidFill>
                   <a:schemeClr val="dk1"/>
                 </a:solidFill>
@@ -12746,7 +12746,7 @@
               <a:t>Syntax: </a:t>
             </a:r>
             <a:r>
-              <a:rPr lang="en" sz="1600">
+              <a:rPr lang="en" sz="1600" dirty="0">
                 <a:solidFill>
                   <a:srgbClr val="000000"/>
                 </a:solidFill>
@@ -12756,7 +12756,7 @@
               </a:rPr>
               <a:t>    borrows(&amp;s);  // s still valid</a:t>
             </a:r>
-            <a:endParaRPr sz="1600">
+            <a:endParaRPr sz="1600" dirty="0">
               <a:solidFill>
                 <a:srgbClr val="000000"/>
               </a:solidFill>
@@ -12776,14 +12776,14 @@
               <a:buNone/>
             </a:pPr>
             <a:r>
-              <a:rPr lang="en" sz="1600">
+              <a:rPr lang="en" sz="1600" dirty="0">
                 <a:solidFill>
                   <a:schemeClr val="dk1"/>
                 </a:solidFill>
               </a:rPr>
               <a:t>Function signature changed to accept reference</a:t>
             </a:r>
-            <a:endParaRPr sz="1600">
+            <a:endParaRPr sz="1600" dirty="0">
               <a:solidFill>
                 <a:srgbClr val="000000"/>
               </a:solidFill>
@@ -12806,7 +12806,7 @@
               <a:buNone/>
             </a:pPr>
             <a:r>
-              <a:rPr lang="en" sz="1600">
+              <a:rPr lang="en" sz="1600" dirty="0">
                 <a:solidFill>
                   <a:srgbClr val="000000"/>
                 </a:solidFill>
@@ -12816,7 +12816,7 @@
               </a:rPr>
               <a:t>    fn borrows(str: &amp;String) {  }</a:t>
             </a:r>
-            <a:endParaRPr sz="1600">
+            <a:endParaRPr sz="1600" dirty="0">
               <a:solidFill>
                 <a:srgbClr val="000000"/>
               </a:solidFill>
@@ -12835,7 +12835,7 @@
               </a:spcAft>
               <a:buNone/>
             </a:pPr>
-            <a:endParaRPr sz="1600">
+            <a:endParaRPr sz="1600" dirty="0">
               <a:solidFill>
                 <a:srgbClr val="000000"/>
               </a:solidFill>
@@ -12845,24 +12845,21 @@
             </a:endParaRPr>
           </a:p>
           <a:p>
-            <a:pPr marL="0" lvl="0" indent="0" algn="l" rtl="0">
-              <a:spcBef>
-                <a:spcPts val="0"/>
-              </a:spcBef>
+            <a:pPr marL="0" lvl="0" indent="0">
               <a:spcAft>
                 <a:spcPts val="1200"/>
               </a:spcAft>
               <a:buNone/>
             </a:pPr>
             <a:r>
-              <a:rPr lang="en" sz="1600">
+              <a:rPr lang="en-US" sz="1600" dirty="0">
                 <a:solidFill>
                   <a:schemeClr val="dk1"/>
                 </a:solidFill>
               </a:rPr>
-              <a:t>Ownership transferred to some_string, value dropped after function returned</a:t>
+              <a:t>Common functionality retained with a single owner</a:t>
             </a:r>
-            <a:endParaRPr/>
+            <a:endParaRPr dirty="0"/>
           </a:p>
         </p:txBody>
       </p:sp>
@@ -13351,9 +13348,9 @@
                                           </p:stCondLst>
                                         </p:cTn>
                                         <p:tgtEl>
-                                          <p:spTgt spid="147">
-                                            <p:txEl>
-                                              <p:pRg st="4" end="4"/>
+                                          <p:spTgt spid="148">
+                                            <p:txEl>
+                                              <p:pRg st="0" end="0"/>
                                             </p:txEl>
                                           </p:spTgt>
                                         </p:tgtEl>
@@ -13369,9 +13366,9 @@
                                       <p:cBhvr>
                                         <p:cTn id="27" dur="100"/>
                                         <p:tgtEl>
-                                          <p:spTgt spid="147">
-                                            <p:txEl>
-                                              <p:pRg st="4" end="4"/>
+                                          <p:spTgt spid="148">
+                                            <p:txEl>
+                                              <p:pRg st="0" end="0"/>
                                             </p:txEl>
                                           </p:spTgt>
                                         </p:tgtEl>
@@ -13412,9 +13409,9 @@
                                           </p:stCondLst>
                                         </p:cTn>
                                         <p:tgtEl>
-                                          <p:spTgt spid="147">
-                                            <p:txEl>
-                                              <p:pRg st="5" end="5"/>
+                                          <p:spTgt spid="148">
+                                            <p:txEl>
+                                              <p:pRg st="1" end="1"/>
                                             </p:txEl>
                                           </p:spTgt>
                                         </p:tgtEl>
@@ -13430,9 +13427,9 @@
                                       <p:cBhvr>
                                         <p:cTn id="32" dur="100"/>
                                         <p:tgtEl>
-                                          <p:spTgt spid="147">
-                                            <p:txEl>
-                                              <p:pRg st="5" end="5"/>
+                                          <p:spTgt spid="148">
+                                            <p:txEl>
+                                              <p:pRg st="1" end="1"/>
                                             </p:txEl>
                                           </p:spTgt>
                                         </p:tgtEl>
@@ -13475,7 +13472,7 @@
                                         <p:tgtEl>
                                           <p:spTgt spid="148">
                                             <p:txEl>
-                                              <p:pRg st="0" end="0"/>
+                                              <p:pRg st="2" end="2"/>
                                             </p:txEl>
                                           </p:spTgt>
                                         </p:tgtEl>
@@ -13493,7 +13490,7 @@
                                         <p:tgtEl>
                                           <p:spTgt spid="148">
                                             <p:txEl>
-                                              <p:pRg st="0" end="0"/>
+                                              <p:pRg st="2" end="2"/>
                                             </p:txEl>
                                           </p:spTgt>
                                         </p:tgtEl>
@@ -13536,7 +13533,7 @@
                                         <p:tgtEl>
                                           <p:spTgt spid="148">
                                             <p:txEl>
-                                              <p:pRg st="1" end="1"/>
+                                              <p:pRg st="3" end="3"/>
                                             </p:txEl>
                                           </p:spTgt>
                                         </p:tgtEl>
@@ -13554,7 +13551,7 @@
                                         <p:tgtEl>
                                           <p:spTgt spid="148">
                                             <p:txEl>
-                                              <p:pRg st="1" end="1"/>
+                                              <p:pRg st="3" end="3"/>
                                             </p:txEl>
                                           </p:spTgt>
                                         </p:tgtEl>
@@ -13597,7 +13594,7 @@
                                         <p:tgtEl>
                                           <p:spTgt spid="148">
                                             <p:txEl>
-                                              <p:pRg st="2" end="2"/>
+                                              <p:pRg st="4" end="4"/>
                                             </p:txEl>
                                           </p:spTgt>
                                         </p:tgtEl>
@@ -13615,7 +13612,7 @@
                                         <p:tgtEl>
                                           <p:spTgt spid="148">
                                             <p:txEl>
-                                              <p:pRg st="2" end="2"/>
+                                              <p:pRg st="4" end="4"/>
                                             </p:txEl>
                                           </p:spTgt>
                                         </p:tgtEl>
@@ -13658,7 +13655,7 @@
                                         <p:tgtEl>
                                           <p:spTgt spid="148">
                                             <p:txEl>
-                                              <p:pRg st="3" end="3"/>
+                                              <p:pRg st="5" end="5"/>
                                             </p:txEl>
                                           </p:spTgt>
                                         </p:tgtEl>
@@ -13676,7 +13673,7 @@
                                         <p:tgtEl>
                                           <p:spTgt spid="148">
                                             <p:txEl>
-                                              <p:pRg st="3" end="3"/>
+                                              <p:pRg st="5" end="5"/>
                                             </p:txEl>
                                           </p:spTgt>
                                         </p:tgtEl>
@@ -13719,7 +13716,7 @@
                                         <p:tgtEl>
                                           <p:spTgt spid="148">
                                             <p:txEl>
-                                              <p:pRg st="4" end="4"/>
+                                              <p:pRg st="6" end="6"/>
                                             </p:txEl>
                                           </p:spTgt>
                                         </p:tgtEl>
@@ -13737,7 +13734,7 @@
                                         <p:tgtEl>
                                           <p:spTgt spid="148">
                                             <p:txEl>
-                                              <p:pRg st="4" end="4"/>
+                                              <p:pRg st="6" end="6"/>
                                             </p:txEl>
                                           </p:spTgt>
                                         </p:tgtEl>
@@ -13780,7 +13777,7 @@
                                         <p:tgtEl>
                                           <p:spTgt spid="148">
                                             <p:txEl>
-                                              <p:pRg st="5" end="5"/>
+                                              <p:pRg st="7" end="7"/>
                                             </p:txEl>
                                           </p:spTgt>
                                         </p:tgtEl>
@@ -13795,128 +13792,6 @@
                                     <p:animEffect transition="in" filter="fade">
                                       <p:cBhvr>
                                         <p:cTn id="62" dur="100"/>
-                                        <p:tgtEl>
-                                          <p:spTgt spid="148">
-                                            <p:txEl>
-                                              <p:pRg st="5" end="5"/>
-                                            </p:txEl>
-                                          </p:spTgt>
-                                        </p:tgtEl>
-                                      </p:cBhvr>
-                                    </p:animEffect>
-                                  </p:childTnLst>
-                                </p:cTn>
-                              </p:par>
-                            </p:childTnLst>
-                          </p:cTn>
-                        </p:par>
-                      </p:childTnLst>
-                    </p:cTn>
-                  </p:par>
-                  <p:par>
-                    <p:cTn id="63" fill="hold">
-                      <p:stCondLst>
-                        <p:cond delay="indefinite"/>
-                      </p:stCondLst>
-                      <p:childTnLst>
-                        <p:par>
-                          <p:cTn id="64" fill="hold">
-                            <p:stCondLst>
-                              <p:cond delay="0"/>
-                            </p:stCondLst>
-                            <p:childTnLst>
-                              <p:par>
-                                <p:cTn id="65" presetID="10" presetClass="entr" presetSubtype="0" fill="hold" nodeType="clickEffect">
-                                  <p:stCondLst>
-                                    <p:cond delay="0"/>
-                                  </p:stCondLst>
-                                  <p:childTnLst>
-                                    <p:set>
-                                      <p:cBhvr>
-                                        <p:cTn id="66" dur="1" fill="hold">
-                                          <p:stCondLst>
-                                            <p:cond delay="0"/>
-                                          </p:stCondLst>
-                                        </p:cTn>
-                                        <p:tgtEl>
-                                          <p:spTgt spid="148">
-                                            <p:txEl>
-                                              <p:pRg st="6" end="6"/>
-                                            </p:txEl>
-                                          </p:spTgt>
-                                        </p:tgtEl>
-                                        <p:attrNameLst>
-                                          <p:attrName>style.visibility</p:attrName>
-                                        </p:attrNameLst>
-                                      </p:cBhvr>
-                                      <p:to>
-                                        <p:strVal val="visible"/>
-                                      </p:to>
-                                    </p:set>
-                                    <p:animEffect transition="in" filter="fade">
-                                      <p:cBhvr>
-                                        <p:cTn id="67" dur="100"/>
-                                        <p:tgtEl>
-                                          <p:spTgt spid="148">
-                                            <p:txEl>
-                                              <p:pRg st="6" end="6"/>
-                                            </p:txEl>
-                                          </p:spTgt>
-                                        </p:tgtEl>
-                                      </p:cBhvr>
-                                    </p:animEffect>
-                                  </p:childTnLst>
-                                </p:cTn>
-                              </p:par>
-                            </p:childTnLst>
-                          </p:cTn>
-                        </p:par>
-                      </p:childTnLst>
-                    </p:cTn>
-                  </p:par>
-                  <p:par>
-                    <p:cTn id="68" fill="hold">
-                      <p:stCondLst>
-                        <p:cond delay="indefinite"/>
-                      </p:stCondLst>
-                      <p:childTnLst>
-                        <p:par>
-                          <p:cTn id="69" fill="hold">
-                            <p:stCondLst>
-                              <p:cond delay="0"/>
-                            </p:stCondLst>
-                            <p:childTnLst>
-                              <p:par>
-                                <p:cTn id="70" presetID="10" presetClass="entr" presetSubtype="0" fill="hold" nodeType="clickEffect">
-                                  <p:stCondLst>
-                                    <p:cond delay="0"/>
-                                  </p:stCondLst>
-                                  <p:childTnLst>
-                                    <p:set>
-                                      <p:cBhvr>
-                                        <p:cTn id="71" dur="1" fill="hold">
-                                          <p:stCondLst>
-                                            <p:cond delay="0"/>
-                                          </p:stCondLst>
-                                        </p:cTn>
-                                        <p:tgtEl>
-                                          <p:spTgt spid="148">
-                                            <p:txEl>
-                                              <p:pRg st="7" end="7"/>
-                                            </p:txEl>
-                                          </p:spTgt>
-                                        </p:tgtEl>
-                                        <p:attrNameLst>
-                                          <p:attrName>style.visibility</p:attrName>
-                                        </p:attrNameLst>
-                                      </p:cBhvr>
-                                      <p:to>
-                                        <p:strVal val="visible"/>
-                                      </p:to>
-                                    </p:set>
-                                    <p:animEffect transition="in" filter="fade">
-                                      <p:cBhvr>
-                                        <p:cTn id="72" dur="100"/>
                                         <p:tgtEl>
                                           <p:spTgt spid="148">
                                             <p:txEl>

</xml_diff>

<commit_message>
Added some images for MSC algorithm
</commit_message>
<xml_diff>
--- a/presentation.pptx
+++ b/presentation.pptx
@@ -826,7 +826,7 @@
   <p:cSld>
     <p:spTree>
       <p:nvGrpSpPr>
-        <p:cNvPr id="1" name="Shape 110"/>
+        <p:cNvPr id="1" name="Shape 113"/>
         <p:cNvGrpSpPr/>
         <p:nvPr/>
       </p:nvGrpSpPr>
@@ -840,7 +840,7 @@
       </p:grpSpPr>
       <p:sp>
         <p:nvSpPr>
-          <p:cNvPr id="111" name="Google Shape;111;ge239364bd6_0_30:notes"/>
+          <p:cNvPr id="114" name="Google Shape;114;ge239364bd6_0_30:notes"/>
           <p:cNvSpPr>
             <a:spLocks noGrp="1" noRot="1" noChangeAspect="1"/>
           </p:cNvSpPr>
@@ -881,7 +881,7 @@
       </p:sp>
       <p:sp>
         <p:nvSpPr>
-          <p:cNvPr id="112" name="Google Shape;112;ge239364bd6_0_30:notes"/>
+          <p:cNvPr id="115" name="Google Shape;115;ge239364bd6_0_30:notes"/>
           <p:cNvSpPr txBox="1">
             <a:spLocks noGrp="1"/>
           </p:cNvSpPr>
@@ -930,7 +930,7 @@
   <p:cSld>
     <p:spTree>
       <p:nvGrpSpPr>
-        <p:cNvPr id="1" name="Shape 116"/>
+        <p:cNvPr id="1" name="Shape 119"/>
         <p:cNvGrpSpPr/>
         <p:nvPr/>
       </p:nvGrpSpPr>
@@ -944,7 +944,7 @@
       </p:grpSpPr>
       <p:sp>
         <p:nvSpPr>
-          <p:cNvPr id="117" name="Google Shape;117;gc6fa3c898_0_28:notes"/>
+          <p:cNvPr id="120" name="Google Shape;120;gc6fa3c898_0_28:notes"/>
           <p:cNvSpPr>
             <a:spLocks noGrp="1" noRot="1" noChangeAspect="1"/>
           </p:cNvSpPr>
@@ -985,7 +985,7 @@
       </p:sp>
       <p:sp>
         <p:nvSpPr>
-          <p:cNvPr id="118" name="Google Shape;118;gc6fa3c898_0_28:notes"/>
+          <p:cNvPr id="121" name="Google Shape;121;gc6fa3c898_0_28:notes"/>
           <p:cNvSpPr txBox="1">
             <a:spLocks noGrp="1"/>
           </p:cNvSpPr>
@@ -1034,7 +1034,7 @@
   <p:cSld>
     <p:spTree>
       <p:nvGrpSpPr>
-        <p:cNvPr id="1" name="Shape 121"/>
+        <p:cNvPr id="1" name="Shape 124"/>
         <p:cNvGrpSpPr/>
         <p:nvPr/>
       </p:nvGrpSpPr>
@@ -1048,7 +1048,7 @@
       </p:grpSpPr>
       <p:sp>
         <p:nvSpPr>
-          <p:cNvPr id="122" name="Google Shape;122;ge239364bd6_0_38:notes"/>
+          <p:cNvPr id="125" name="Google Shape;125;ge239364bd6_0_38:notes"/>
           <p:cNvSpPr>
             <a:spLocks noGrp="1" noRot="1" noChangeAspect="1"/>
           </p:cNvSpPr>
@@ -1089,7 +1089,7 @@
       </p:sp>
       <p:sp>
         <p:nvSpPr>
-          <p:cNvPr id="123" name="Google Shape;123;ge239364bd6_0_38:notes"/>
+          <p:cNvPr id="126" name="Google Shape;126;ge239364bd6_0_38:notes"/>
           <p:cNvSpPr txBox="1">
             <a:spLocks noGrp="1"/>
           </p:cNvSpPr>
@@ -1138,7 +1138,7 @@
   <p:cSld>
     <p:spTree>
       <p:nvGrpSpPr>
-        <p:cNvPr id="1" name="Shape 128"/>
+        <p:cNvPr id="1" name="Shape 131"/>
         <p:cNvGrpSpPr/>
         <p:nvPr/>
       </p:nvGrpSpPr>
@@ -1152,7 +1152,7 @@
       </p:grpSpPr>
       <p:sp>
         <p:nvSpPr>
-          <p:cNvPr id="129" name="Google Shape;129;ge239364bd6_0_46:notes"/>
+          <p:cNvPr id="132" name="Google Shape;132;ge239364bd6_0_46:notes"/>
           <p:cNvSpPr>
             <a:spLocks noGrp="1" noRot="1" noChangeAspect="1"/>
           </p:cNvSpPr>
@@ -1193,7 +1193,7 @@
       </p:sp>
       <p:sp>
         <p:nvSpPr>
-          <p:cNvPr id="130" name="Google Shape;130;ge239364bd6_0_46:notes"/>
+          <p:cNvPr id="133" name="Google Shape;133;ge239364bd6_0_46:notes"/>
           <p:cNvSpPr txBox="1">
             <a:spLocks noGrp="1"/>
           </p:cNvSpPr>
@@ -1242,7 +1242,7 @@
   <p:cSld>
     <p:spTree>
       <p:nvGrpSpPr>
-        <p:cNvPr id="1" name="Shape 135"/>
+        <p:cNvPr id="1" name="Shape 138"/>
         <p:cNvGrpSpPr/>
         <p:nvPr/>
       </p:nvGrpSpPr>
@@ -1256,7 +1256,7 @@
       </p:grpSpPr>
       <p:sp>
         <p:nvSpPr>
-          <p:cNvPr id="136" name="Google Shape;136;ge239364bd6_0_58:notes"/>
+          <p:cNvPr id="139" name="Google Shape;139;ge239364bd6_0_58:notes"/>
           <p:cNvSpPr>
             <a:spLocks noGrp="1" noRot="1" noChangeAspect="1"/>
           </p:cNvSpPr>
@@ -1297,7 +1297,7 @@
       </p:sp>
       <p:sp>
         <p:nvSpPr>
-          <p:cNvPr id="137" name="Google Shape;137;ge239364bd6_0_58:notes"/>
+          <p:cNvPr id="140" name="Google Shape;140;ge239364bd6_0_58:notes"/>
           <p:cNvSpPr txBox="1">
             <a:spLocks noGrp="1"/>
           </p:cNvSpPr>
@@ -1346,7 +1346,7 @@
   <p:cSld>
     <p:spTree>
       <p:nvGrpSpPr>
-        <p:cNvPr id="1" name="Shape 142"/>
+        <p:cNvPr id="1" name="Shape 145"/>
         <p:cNvGrpSpPr/>
         <p:nvPr/>
       </p:nvGrpSpPr>
@@ -1360,111 +1360,7 @@
       </p:grpSpPr>
       <p:sp>
         <p:nvSpPr>
-          <p:cNvPr id="143" name="Google Shape;143;ge239364bd6_0_76:notes"/>
-          <p:cNvSpPr>
-            <a:spLocks noGrp="1" noRot="1" noChangeAspect="1"/>
-          </p:cNvSpPr>
-          <p:nvPr>
-            <p:ph type="sldImg" idx="2"/>
-          </p:nvPr>
-        </p:nvSpPr>
-        <p:spPr>
-          <a:xfrm>
-            <a:off x="381000" y="685800"/>
-            <a:ext cx="6096000" cy="3429000"/>
-          </a:xfrm>
-          <a:custGeom>
-            <a:avLst/>
-            <a:gdLst/>
-            <a:ahLst/>
-            <a:cxnLst/>
-            <a:rect l="l" t="t" r="r" b="b"/>
-            <a:pathLst>
-              <a:path w="120000" h="120000" extrusionOk="0">
-                <a:moveTo>
-                  <a:pt x="0" y="0"/>
-                </a:moveTo>
-                <a:lnTo>
-                  <a:pt x="120000" y="0"/>
-                </a:lnTo>
-                <a:lnTo>
-                  <a:pt x="120000" y="120000"/>
-                </a:lnTo>
-                <a:lnTo>
-                  <a:pt x="0" y="120000"/>
-                </a:lnTo>
-                <a:close/>
-              </a:path>
-            </a:pathLst>
-          </a:custGeom>
-        </p:spPr>
-      </p:sp>
-      <p:sp>
-        <p:nvSpPr>
-          <p:cNvPr id="144" name="Google Shape;144;ge239364bd6_0_76:notes"/>
-          <p:cNvSpPr txBox="1">
-            <a:spLocks noGrp="1"/>
-          </p:cNvSpPr>
-          <p:nvPr>
-            <p:ph type="body" idx="1"/>
-          </p:nvPr>
-        </p:nvSpPr>
-        <p:spPr>
-          <a:xfrm>
-            <a:off x="685800" y="4343400"/>
-            <a:ext cx="5486400" cy="4114800"/>
-          </a:xfrm>
-          <a:prstGeom prst="rect">
-            <a:avLst/>
-          </a:prstGeom>
-        </p:spPr>
-        <p:txBody>
-          <a:bodyPr spcFirstLastPara="1" wrap="square" lIns="91425" tIns="91425" rIns="91425" bIns="91425" anchor="t" anchorCtr="0">
-            <a:noAutofit/>
-          </a:bodyPr>
-          <a:lstStyle/>
-          <a:p>
-            <a:pPr marL="0" lvl="0" indent="0" algn="l" rtl="0">
-              <a:spcBef>
-                <a:spcPts val="0"/>
-              </a:spcBef>
-              <a:spcAft>
-                <a:spcPts val="0"/>
-              </a:spcAft>
-              <a:buNone/>
-            </a:pPr>
-            <a:endParaRPr/>
-          </a:p>
-        </p:txBody>
-      </p:sp>
-    </p:spTree>
-  </p:cSld>
-  <p:clrMapOvr>
-    <a:masterClrMapping/>
-  </p:clrMapOvr>
-</p:notes>
-</file>
-
-<file path=ppt/notesSlides/notesSlide16.xml><?xml version="1.0" encoding="utf-8"?>
-<p:notes xmlns:a="http://schemas.openxmlformats.org/drawingml/2006/main" xmlns:r="http://schemas.openxmlformats.org/officeDocument/2006/relationships" xmlns:p="http://schemas.openxmlformats.org/presentationml/2006/main" showMasterSp="0" showMasterPhAnim="0">
-  <p:cSld>
-    <p:spTree>
-      <p:nvGrpSpPr>
-        <p:cNvPr id="1" name="Shape 149"/>
-        <p:cNvGrpSpPr/>
-        <p:nvPr/>
-      </p:nvGrpSpPr>
-      <p:grpSpPr>
-        <a:xfrm>
-          <a:off x="0" y="0"/>
-          <a:ext cx="0" cy="0"/>
-          <a:chOff x="0" y="0"/>
-          <a:chExt cx="0" cy="0"/>
-        </a:xfrm>
-      </p:grpSpPr>
-      <p:sp>
-        <p:nvSpPr>
-          <p:cNvPr id="150" name="Google Shape;150;ge239364bd6_0_69:notes"/>
+          <p:cNvPr id="146" name="Google Shape;146;ge239364bd6_0_76:notes"/>
           <p:cNvSpPr>
             <a:spLocks noGrp="1" noRot="1" noChangeAspect="1"/>
           </p:cNvSpPr>
@@ -1505,7 +1401,7 @@
       </p:sp>
       <p:sp>
         <p:nvSpPr>
-          <p:cNvPr id="151" name="Google Shape;151;ge239364bd6_0_69:notes"/>
+          <p:cNvPr id="147" name="Google Shape;147;ge239364bd6_0_76:notes"/>
           <p:cNvSpPr txBox="1">
             <a:spLocks noGrp="1"/>
           </p:cNvSpPr>
@@ -1549,12 +1445,12 @@
 </p:notes>
 </file>
 
-<file path=ppt/notesSlides/notesSlide17.xml><?xml version="1.0" encoding="utf-8"?>
+<file path=ppt/notesSlides/notesSlide16.xml><?xml version="1.0" encoding="utf-8"?>
 <p:notes xmlns:a="http://schemas.openxmlformats.org/drawingml/2006/main" xmlns:r="http://schemas.openxmlformats.org/officeDocument/2006/relationships" xmlns:p="http://schemas.openxmlformats.org/presentationml/2006/main" showMasterSp="0" showMasterPhAnim="0">
   <p:cSld>
     <p:spTree>
       <p:nvGrpSpPr>
-        <p:cNvPr id="1" name="Shape 156"/>
+        <p:cNvPr id="1" name="Shape 152"/>
         <p:cNvGrpSpPr/>
         <p:nvPr/>
       </p:nvGrpSpPr>
@@ -1568,7 +1464,111 @@
       </p:grpSpPr>
       <p:sp>
         <p:nvSpPr>
-          <p:cNvPr id="157" name="Google Shape;157;gc6fa3c898_0_70:notes"/>
+          <p:cNvPr id="153" name="Google Shape;153;ge239364bd6_0_69:notes"/>
+          <p:cNvSpPr>
+            <a:spLocks noGrp="1" noRot="1" noChangeAspect="1"/>
+          </p:cNvSpPr>
+          <p:nvPr>
+            <p:ph type="sldImg" idx="2"/>
+          </p:nvPr>
+        </p:nvSpPr>
+        <p:spPr>
+          <a:xfrm>
+            <a:off x="381300" y="685800"/>
+            <a:ext cx="6096000" cy="3429000"/>
+          </a:xfrm>
+          <a:custGeom>
+            <a:avLst/>
+            <a:gdLst/>
+            <a:ahLst/>
+            <a:cxnLst/>
+            <a:rect l="l" t="t" r="r" b="b"/>
+            <a:pathLst>
+              <a:path w="120000" h="120000" extrusionOk="0">
+                <a:moveTo>
+                  <a:pt x="0" y="0"/>
+                </a:moveTo>
+                <a:lnTo>
+                  <a:pt x="120000" y="0"/>
+                </a:lnTo>
+                <a:lnTo>
+                  <a:pt x="120000" y="120000"/>
+                </a:lnTo>
+                <a:lnTo>
+                  <a:pt x="0" y="120000"/>
+                </a:lnTo>
+                <a:close/>
+              </a:path>
+            </a:pathLst>
+          </a:custGeom>
+        </p:spPr>
+      </p:sp>
+      <p:sp>
+        <p:nvSpPr>
+          <p:cNvPr id="154" name="Google Shape;154;ge239364bd6_0_69:notes"/>
+          <p:cNvSpPr txBox="1">
+            <a:spLocks noGrp="1"/>
+          </p:cNvSpPr>
+          <p:nvPr>
+            <p:ph type="body" idx="1"/>
+          </p:nvPr>
+        </p:nvSpPr>
+        <p:spPr>
+          <a:xfrm>
+            <a:off x="685800" y="4343400"/>
+            <a:ext cx="5486400" cy="4114800"/>
+          </a:xfrm>
+          <a:prstGeom prst="rect">
+            <a:avLst/>
+          </a:prstGeom>
+        </p:spPr>
+        <p:txBody>
+          <a:bodyPr spcFirstLastPara="1" wrap="square" lIns="91425" tIns="91425" rIns="91425" bIns="91425" anchor="t" anchorCtr="0">
+            <a:noAutofit/>
+          </a:bodyPr>
+          <a:lstStyle/>
+          <a:p>
+            <a:pPr marL="0" lvl="0" indent="0" algn="l" rtl="0">
+              <a:spcBef>
+                <a:spcPts val="0"/>
+              </a:spcBef>
+              <a:spcAft>
+                <a:spcPts val="0"/>
+              </a:spcAft>
+              <a:buNone/>
+            </a:pPr>
+            <a:endParaRPr/>
+          </a:p>
+        </p:txBody>
+      </p:sp>
+    </p:spTree>
+  </p:cSld>
+  <p:clrMapOvr>
+    <a:masterClrMapping/>
+  </p:clrMapOvr>
+</p:notes>
+</file>
+
+<file path=ppt/notesSlides/notesSlide17.xml><?xml version="1.0" encoding="utf-8"?>
+<p:notes xmlns:a="http://schemas.openxmlformats.org/drawingml/2006/main" xmlns:r="http://schemas.openxmlformats.org/officeDocument/2006/relationships" xmlns:p="http://schemas.openxmlformats.org/presentationml/2006/main" showMasterSp="0" showMasterPhAnim="0">
+  <p:cSld>
+    <p:spTree>
+      <p:nvGrpSpPr>
+        <p:cNvPr id="1" name="Shape 159"/>
+        <p:cNvGrpSpPr/>
+        <p:nvPr/>
+      </p:nvGrpSpPr>
+      <p:grpSpPr>
+        <a:xfrm>
+          <a:off x="0" y="0"/>
+          <a:ext cx="0" cy="0"/>
+          <a:chOff x="0" y="0"/>
+          <a:chExt cx="0" cy="0"/>
+        </a:xfrm>
+      </p:grpSpPr>
+      <p:sp>
+        <p:nvSpPr>
+          <p:cNvPr id="160" name="Google Shape;160;gc6fa3c898_0_70:notes"/>
           <p:cNvSpPr>
             <a:spLocks noGrp="1" noRot="1" noChangeAspect="1"/>
           </p:cNvSpPr>
@@ -1609,7 +1609,7 @@
       </p:sp>
       <p:sp>
         <p:nvSpPr>
-          <p:cNvPr id="158" name="Google Shape;158;gc6fa3c898_0_70:notes"/>
+          <p:cNvPr id="161" name="Google Shape;161;gc6fa3c898_0_70:notes"/>
           <p:cNvSpPr txBox="1">
             <a:spLocks noGrp="1"/>
           </p:cNvSpPr>
@@ -2306,7 +2306,7 @@
         </p:nvSpPr>
         <p:spPr>
           <a:xfrm>
-            <a:off x="381000" y="685800"/>
+            <a:off x="381300" y="685800"/>
             <a:ext cx="6096000" cy="3429000"/>
           </a:xfrm>
           <a:custGeom>
@@ -2386,7 +2386,7 @@
   <p:cSld>
     <p:spTree>
       <p:nvGrpSpPr>
-        <p:cNvPr id="1" name="Shape 103"/>
+        <p:cNvPr id="1" name="Shape 106"/>
         <p:cNvGrpSpPr/>
         <p:nvPr/>
       </p:nvGrpSpPr>
@@ -2400,7 +2400,7 @@
       </p:grpSpPr>
       <p:sp>
         <p:nvSpPr>
-          <p:cNvPr id="104" name="Google Shape;104;ge239364bd6_0_24:notes"/>
+          <p:cNvPr id="107" name="Google Shape;107;ge239364bd6_0_24:notes"/>
           <p:cNvSpPr>
             <a:spLocks noGrp="1" noRot="1" noChangeAspect="1"/>
           </p:cNvSpPr>
@@ -2441,7 +2441,7 @@
       </p:sp>
       <p:sp>
         <p:nvSpPr>
-          <p:cNvPr id="105" name="Google Shape;105;ge239364bd6_0_24:notes"/>
+          <p:cNvPr id="108" name="Google Shape;108;ge239364bd6_0_24:notes"/>
           <p:cNvSpPr txBox="1">
             <a:spLocks noGrp="1"/>
           </p:cNvSpPr>
@@ -7411,7 +7411,7 @@
   <p:cSld>
     <p:spTree>
       <p:nvGrpSpPr>
-        <p:cNvPr id="1" name="Shape 113"/>
+        <p:cNvPr id="1" name="Shape 116"/>
         <p:cNvGrpSpPr/>
         <p:nvPr/>
       </p:nvGrpSpPr>
@@ -7425,7 +7425,7 @@
       </p:grpSpPr>
       <p:sp>
         <p:nvSpPr>
-          <p:cNvPr id="114" name="Google Shape;114;p22"/>
+          <p:cNvPr id="117" name="Google Shape;117;p22"/>
           <p:cNvSpPr txBox="1">
             <a:spLocks noGrp="1"/>
           </p:cNvSpPr>
@@ -7467,7 +7467,7 @@
       </p:sp>
       <p:sp>
         <p:nvSpPr>
-          <p:cNvPr id="115" name="Google Shape;115;p22"/>
+          <p:cNvPr id="118" name="Google Shape;118;p22"/>
           <p:cNvSpPr txBox="1">
             <a:spLocks noGrp="1"/>
           </p:cNvSpPr>
@@ -7594,7 +7594,7 @@
                                           </p:stCondLst>
                                         </p:cTn>
                                         <p:tgtEl>
-                                          <p:spTgt spid="115">
+                                          <p:spTgt spid="118">
                                             <p:txEl>
                                               <p:pRg st="0" end="0"/>
                                             </p:txEl>
@@ -7612,7 +7612,7 @@
                                       <p:cBhvr>
                                         <p:cTn id="7" dur="100"/>
                                         <p:tgtEl>
-                                          <p:spTgt spid="115">
+                                          <p:spTgt spid="118">
                                             <p:txEl>
                                               <p:pRg st="0" end="0"/>
                                             </p:txEl>
@@ -7655,7 +7655,7 @@
                                           </p:stCondLst>
                                         </p:cTn>
                                         <p:tgtEl>
-                                          <p:spTgt spid="115">
+                                          <p:spTgt spid="118">
                                             <p:txEl>
                                               <p:pRg st="1" end="1"/>
                                             </p:txEl>
@@ -7673,7 +7673,7 @@
                                       <p:cBhvr>
                                         <p:cTn id="12" dur="100"/>
                                         <p:tgtEl>
-                                          <p:spTgt spid="115">
+                                          <p:spTgt spid="118">
                                             <p:txEl>
                                               <p:pRg st="1" end="1"/>
                                             </p:txEl>
@@ -7716,7 +7716,7 @@
                                           </p:stCondLst>
                                         </p:cTn>
                                         <p:tgtEl>
-                                          <p:spTgt spid="115">
+                                          <p:spTgt spid="118">
                                             <p:txEl>
                                               <p:pRg st="2" end="2"/>
                                             </p:txEl>
@@ -7734,7 +7734,7 @@
                                       <p:cBhvr>
                                         <p:cTn id="17" dur="100"/>
                                         <p:tgtEl>
-                                          <p:spTgt spid="115">
+                                          <p:spTgt spid="118">
                                             <p:txEl>
                                               <p:pRg st="2" end="2"/>
                                             </p:txEl>
@@ -7777,7 +7777,7 @@
                                           </p:stCondLst>
                                         </p:cTn>
                                         <p:tgtEl>
-                                          <p:spTgt spid="115">
+                                          <p:spTgt spid="118">
                                             <p:txEl>
                                               <p:pRg st="3" end="3"/>
                                             </p:txEl>
@@ -7795,7 +7795,7 @@
                                       <p:cBhvr>
                                         <p:cTn id="22" dur="100"/>
                                         <p:tgtEl>
-                                          <p:spTgt spid="115">
+                                          <p:spTgt spid="118">
                                             <p:txEl>
                                               <p:pRg st="3" end="3"/>
                                             </p:txEl>
@@ -7842,7 +7842,7 @@
   <p:cSld>
     <p:spTree>
       <p:nvGrpSpPr>
-        <p:cNvPr id="1" name="Shape 119"/>
+        <p:cNvPr id="1" name="Shape 122"/>
         <p:cNvGrpSpPr/>
         <p:nvPr/>
       </p:nvGrpSpPr>
@@ -7856,7 +7856,7 @@
       </p:grpSpPr>
       <p:sp>
         <p:nvSpPr>
-          <p:cNvPr id="120" name="Google Shape;120;p23"/>
+          <p:cNvPr id="123" name="Google Shape;123;p23"/>
           <p:cNvSpPr txBox="1">
             <a:spLocks noGrp="1"/>
           </p:cNvSpPr>
@@ -7909,7 +7909,7 @@
   <p:cSld>
     <p:spTree>
       <p:nvGrpSpPr>
-        <p:cNvPr id="1" name="Shape 124"/>
+        <p:cNvPr id="1" name="Shape 127"/>
         <p:cNvGrpSpPr/>
         <p:nvPr/>
       </p:nvGrpSpPr>
@@ -7923,7 +7923,7 @@
       </p:grpSpPr>
       <p:sp>
         <p:nvSpPr>
-          <p:cNvPr id="125" name="Google Shape;125;p24"/>
+          <p:cNvPr id="128" name="Google Shape;128;p24"/>
           <p:cNvSpPr txBox="1">
             <a:spLocks noGrp="1"/>
           </p:cNvSpPr>
@@ -7965,7 +7965,7 @@
       </p:sp>
       <p:sp>
         <p:nvSpPr>
-          <p:cNvPr id="126" name="Google Shape;126;p24"/>
+          <p:cNvPr id="129" name="Google Shape;129;p24"/>
           <p:cNvSpPr txBox="1">
             <a:spLocks noGrp="1"/>
           </p:cNvSpPr>
@@ -8175,7 +8175,7 @@
       </p:sp>
       <p:sp>
         <p:nvSpPr>
-          <p:cNvPr id="127" name="Google Shape;127;p24"/>
+          <p:cNvPr id="130" name="Google Shape;130;p24"/>
           <p:cNvSpPr txBox="1">
             <a:spLocks noGrp="1"/>
           </p:cNvSpPr>
@@ -8411,7 +8411,7 @@
                                           </p:stCondLst>
                                         </p:cTn>
                                         <p:tgtEl>
-                                          <p:spTgt spid="126">
+                                          <p:spTgt spid="129">
                                             <p:txEl>
                                               <p:pRg st="0" end="0"/>
                                             </p:txEl>
@@ -8429,7 +8429,7 @@
                                       <p:cBhvr>
                                         <p:cTn id="7" dur="100"/>
                                         <p:tgtEl>
-                                          <p:spTgt spid="126">
+                                          <p:spTgt spid="129">
                                             <p:txEl>
                                               <p:pRg st="0" end="0"/>
                                             </p:txEl>
@@ -8472,7 +8472,7 @@
                                           </p:stCondLst>
                                         </p:cTn>
                                         <p:tgtEl>
-                                          <p:spTgt spid="126">
+                                          <p:spTgt spid="129">
                                             <p:txEl>
                                               <p:pRg st="1" end="1"/>
                                             </p:txEl>
@@ -8490,7 +8490,7 @@
                                       <p:cBhvr>
                                         <p:cTn id="12" dur="100"/>
                                         <p:tgtEl>
-                                          <p:spTgt spid="126">
+                                          <p:spTgt spid="129">
                                             <p:txEl>
                                               <p:pRg st="1" end="1"/>
                                             </p:txEl>
@@ -8533,7 +8533,7 @@
                                           </p:stCondLst>
                                         </p:cTn>
                                         <p:tgtEl>
-                                          <p:spTgt spid="126">
+                                          <p:spTgt spid="129">
                                             <p:txEl>
                                               <p:pRg st="2" end="2"/>
                                             </p:txEl>
@@ -8551,7 +8551,7 @@
                                       <p:cBhvr>
                                         <p:cTn id="17" dur="100"/>
                                         <p:tgtEl>
-                                          <p:spTgt spid="126">
+                                          <p:spTgt spid="129">
                                             <p:txEl>
                                               <p:pRg st="2" end="2"/>
                                             </p:txEl>
@@ -8594,7 +8594,7 @@
                                           </p:stCondLst>
                                         </p:cTn>
                                         <p:tgtEl>
-                                          <p:spTgt spid="126">
+                                          <p:spTgt spid="129">
                                             <p:txEl>
                                               <p:pRg st="3" end="3"/>
                                             </p:txEl>
@@ -8612,7 +8612,7 @@
                                       <p:cBhvr>
                                         <p:cTn id="22" dur="100"/>
                                         <p:tgtEl>
-                                          <p:spTgt spid="126">
+                                          <p:spTgt spid="129">
                                             <p:txEl>
                                               <p:pRg st="3" end="3"/>
                                             </p:txEl>
@@ -8655,7 +8655,7 @@
                                           </p:stCondLst>
                                         </p:cTn>
                                         <p:tgtEl>
-                                          <p:spTgt spid="126">
+                                          <p:spTgt spid="129">
                                             <p:txEl>
                                               <p:pRg st="4" end="4"/>
                                             </p:txEl>
@@ -8673,7 +8673,7 @@
                                       <p:cBhvr>
                                         <p:cTn id="27" dur="100"/>
                                         <p:tgtEl>
-                                          <p:spTgt spid="126">
+                                          <p:spTgt spid="129">
                                             <p:txEl>
                                               <p:pRg st="4" end="4"/>
                                             </p:txEl>
@@ -8716,7 +8716,7 @@
                                           </p:stCondLst>
                                         </p:cTn>
                                         <p:tgtEl>
-                                          <p:spTgt spid="126">
+                                          <p:spTgt spid="129">
                                             <p:txEl>
                                               <p:pRg st="5" end="5"/>
                                             </p:txEl>
@@ -8734,7 +8734,7 @@
                                       <p:cBhvr>
                                         <p:cTn id="32" dur="100"/>
                                         <p:tgtEl>
-                                          <p:spTgt spid="126">
+                                          <p:spTgt spid="129">
                                             <p:txEl>
                                               <p:pRg st="5" end="5"/>
                                             </p:txEl>
@@ -8777,7 +8777,7 @@
                                           </p:stCondLst>
                                         </p:cTn>
                                         <p:tgtEl>
-                                          <p:spTgt spid="126">
+                                          <p:spTgt spid="129">
                                             <p:txEl>
                                               <p:pRg st="6" end="6"/>
                                             </p:txEl>
@@ -8795,7 +8795,7 @@
                                       <p:cBhvr>
                                         <p:cTn id="37" dur="100"/>
                                         <p:tgtEl>
-                                          <p:spTgt spid="126">
+                                          <p:spTgt spid="129">
                                             <p:txEl>
                                               <p:pRg st="6" end="6"/>
                                             </p:txEl>
@@ -8838,7 +8838,7 @@
                                           </p:stCondLst>
                                         </p:cTn>
                                         <p:tgtEl>
-                                          <p:spTgt spid="126">
+                                          <p:spTgt spid="129">
                                             <p:txEl>
                                               <p:pRg st="7" end="7"/>
                                             </p:txEl>
@@ -8856,7 +8856,7 @@
                                       <p:cBhvr>
                                         <p:cTn id="42" dur="100"/>
                                         <p:tgtEl>
-                                          <p:spTgt spid="126">
+                                          <p:spTgt spid="129">
                                             <p:txEl>
                                               <p:pRg st="7" end="7"/>
                                             </p:txEl>
@@ -8899,7 +8899,7 @@
                                           </p:stCondLst>
                                         </p:cTn>
                                         <p:tgtEl>
-                                          <p:spTgt spid="127">
+                                          <p:spTgt spid="130">
                                             <p:txEl>
                                               <p:pRg st="0" end="0"/>
                                             </p:txEl>
@@ -8917,7 +8917,7 @@
                                       <p:cBhvr>
                                         <p:cTn id="47" dur="100"/>
                                         <p:tgtEl>
-                                          <p:spTgt spid="127">
+                                          <p:spTgt spid="130">
                                             <p:txEl>
                                               <p:pRg st="0" end="0"/>
                                             </p:txEl>
@@ -8960,7 +8960,7 @@
                                           </p:stCondLst>
                                         </p:cTn>
                                         <p:tgtEl>
-                                          <p:spTgt spid="127">
+                                          <p:spTgt spid="130">
                                             <p:txEl>
                                               <p:pRg st="1" end="1"/>
                                             </p:txEl>
@@ -8978,7 +8978,7 @@
                                       <p:cBhvr>
                                         <p:cTn id="52" dur="100"/>
                                         <p:tgtEl>
-                                          <p:spTgt spid="127">
+                                          <p:spTgt spid="130">
                                             <p:txEl>
                                               <p:pRg st="1" end="1"/>
                                             </p:txEl>
@@ -9021,7 +9021,7 @@
                                           </p:stCondLst>
                                         </p:cTn>
                                         <p:tgtEl>
-                                          <p:spTgt spid="127">
+                                          <p:spTgt spid="130">
                                             <p:txEl>
                                               <p:pRg st="2" end="2"/>
                                             </p:txEl>
@@ -9039,7 +9039,7 @@
                                       <p:cBhvr>
                                         <p:cTn id="57" dur="100"/>
                                         <p:tgtEl>
-                                          <p:spTgt spid="127">
+                                          <p:spTgt spid="130">
                                             <p:txEl>
                                               <p:pRg st="2" end="2"/>
                                             </p:txEl>
@@ -9082,7 +9082,7 @@
                                           </p:stCondLst>
                                         </p:cTn>
                                         <p:tgtEl>
-                                          <p:spTgt spid="127">
+                                          <p:spTgt spid="130">
                                             <p:txEl>
                                               <p:pRg st="3" end="3"/>
                                             </p:txEl>
@@ -9100,7 +9100,7 @@
                                       <p:cBhvr>
                                         <p:cTn id="62" dur="100"/>
                                         <p:tgtEl>
-                                          <p:spTgt spid="127">
+                                          <p:spTgt spid="130">
                                             <p:txEl>
                                               <p:pRg st="3" end="3"/>
                                             </p:txEl>
@@ -9143,7 +9143,7 @@
                                           </p:stCondLst>
                                         </p:cTn>
                                         <p:tgtEl>
-                                          <p:spTgt spid="127">
+                                          <p:spTgt spid="130">
                                             <p:txEl>
                                               <p:pRg st="4" end="4"/>
                                             </p:txEl>
@@ -9161,7 +9161,7 @@
                                       <p:cBhvr>
                                         <p:cTn id="67" dur="100"/>
                                         <p:tgtEl>
-                                          <p:spTgt spid="127">
+                                          <p:spTgt spid="130">
                                             <p:txEl>
                                               <p:pRg st="4" end="4"/>
                                             </p:txEl>
@@ -9204,7 +9204,7 @@
                                           </p:stCondLst>
                                         </p:cTn>
                                         <p:tgtEl>
-                                          <p:spTgt spid="127">
+                                          <p:spTgt spid="130">
                                             <p:txEl>
                                               <p:pRg st="5" end="5"/>
                                             </p:txEl>
@@ -9222,7 +9222,7 @@
                                       <p:cBhvr>
                                         <p:cTn id="72" dur="100"/>
                                         <p:tgtEl>
-                                          <p:spTgt spid="127">
+                                          <p:spTgt spid="130">
                                             <p:txEl>
                                               <p:pRg st="5" end="5"/>
                                             </p:txEl>
@@ -9265,7 +9265,7 @@
                                           </p:stCondLst>
                                         </p:cTn>
                                         <p:tgtEl>
-                                          <p:spTgt spid="127">
+                                          <p:spTgt spid="130">
                                             <p:txEl>
                                               <p:pRg st="6" end="6"/>
                                             </p:txEl>
@@ -9283,7 +9283,7 @@
                                       <p:cBhvr>
                                         <p:cTn id="77" dur="100"/>
                                         <p:tgtEl>
-                                          <p:spTgt spid="127">
+                                          <p:spTgt spid="130">
                                             <p:txEl>
                                               <p:pRg st="6" end="6"/>
                                             </p:txEl>
@@ -9330,7 +9330,7 @@
   <p:cSld>
     <p:spTree>
       <p:nvGrpSpPr>
-        <p:cNvPr id="1" name="Shape 131"/>
+        <p:cNvPr id="1" name="Shape 134"/>
         <p:cNvGrpSpPr/>
         <p:nvPr/>
       </p:nvGrpSpPr>
@@ -9344,7 +9344,7 @@
       </p:grpSpPr>
       <p:sp>
         <p:nvSpPr>
-          <p:cNvPr id="132" name="Google Shape;132;p25"/>
+          <p:cNvPr id="135" name="Google Shape;135;p25"/>
           <p:cNvSpPr txBox="1">
             <a:spLocks noGrp="1"/>
           </p:cNvSpPr>
@@ -9386,7 +9386,7 @@
       </p:sp>
       <p:sp>
         <p:nvSpPr>
-          <p:cNvPr id="133" name="Google Shape;133;p25"/>
+          <p:cNvPr id="136" name="Google Shape;136;p25"/>
           <p:cNvSpPr txBox="1">
             <a:spLocks noGrp="1"/>
           </p:cNvSpPr>
@@ -9676,7 +9676,7 @@
       </p:sp>
       <p:sp>
         <p:nvSpPr>
-          <p:cNvPr id="134" name="Google Shape;134;p25"/>
+          <p:cNvPr id="137" name="Google Shape;137;p25"/>
           <p:cNvSpPr txBox="1">
             <a:spLocks noGrp="1"/>
           </p:cNvSpPr>
@@ -10012,7 +10012,7 @@
                                           </p:stCondLst>
                                         </p:cTn>
                                         <p:tgtEl>
-                                          <p:spTgt spid="133">
+                                          <p:spTgt spid="136">
                                             <p:txEl>
                                               <p:pRg st="0" end="0"/>
                                             </p:txEl>
@@ -10030,7 +10030,7 @@
                                       <p:cBhvr>
                                         <p:cTn id="7" dur="100"/>
                                         <p:tgtEl>
-                                          <p:spTgt spid="133">
+                                          <p:spTgt spid="136">
                                             <p:txEl>
                                               <p:pRg st="0" end="0"/>
                                             </p:txEl>
@@ -10073,7 +10073,7 @@
                                           </p:stCondLst>
                                         </p:cTn>
                                         <p:tgtEl>
-                                          <p:spTgt spid="133">
+                                          <p:spTgt spid="136">
                                             <p:txEl>
                                               <p:pRg st="1" end="1"/>
                                             </p:txEl>
@@ -10091,7 +10091,7 @@
                                       <p:cBhvr>
                                         <p:cTn id="12" dur="100"/>
                                         <p:tgtEl>
-                                          <p:spTgt spid="133">
+                                          <p:spTgt spid="136">
                                             <p:txEl>
                                               <p:pRg st="1" end="1"/>
                                             </p:txEl>
@@ -10134,7 +10134,7 @@
                                           </p:stCondLst>
                                         </p:cTn>
                                         <p:tgtEl>
-                                          <p:spTgt spid="133">
+                                          <p:spTgt spid="136">
                                             <p:txEl>
                                               <p:pRg st="2" end="2"/>
                                             </p:txEl>
@@ -10152,7 +10152,7 @@
                                       <p:cBhvr>
                                         <p:cTn id="17" dur="100"/>
                                         <p:tgtEl>
-                                          <p:spTgt spid="133">
+                                          <p:spTgt spid="136">
                                             <p:txEl>
                                               <p:pRg st="2" end="2"/>
                                             </p:txEl>
@@ -10195,7 +10195,7 @@
                                           </p:stCondLst>
                                         </p:cTn>
                                         <p:tgtEl>
-                                          <p:spTgt spid="133">
+                                          <p:spTgt spid="136">
                                             <p:txEl>
                                               <p:pRg st="3" end="3"/>
                                             </p:txEl>
@@ -10213,7 +10213,7 @@
                                       <p:cBhvr>
                                         <p:cTn id="22" dur="100"/>
                                         <p:tgtEl>
-                                          <p:spTgt spid="133">
+                                          <p:spTgt spid="136">
                                             <p:txEl>
                                               <p:pRg st="3" end="3"/>
                                             </p:txEl>
@@ -10256,7 +10256,7 @@
                                           </p:stCondLst>
                                         </p:cTn>
                                         <p:tgtEl>
-                                          <p:spTgt spid="133">
+                                          <p:spTgt spid="136">
                                             <p:txEl>
                                               <p:pRg st="4" end="4"/>
                                             </p:txEl>
@@ -10274,7 +10274,7 @@
                                       <p:cBhvr>
                                         <p:cTn id="27" dur="100"/>
                                         <p:tgtEl>
-                                          <p:spTgt spid="133">
+                                          <p:spTgt spid="136">
                                             <p:txEl>
                                               <p:pRg st="4" end="4"/>
                                             </p:txEl>
@@ -10317,7 +10317,7 @@
                                           </p:stCondLst>
                                         </p:cTn>
                                         <p:tgtEl>
-                                          <p:spTgt spid="133">
+                                          <p:spTgt spid="136">
                                             <p:txEl>
                                               <p:pRg st="5" end="5"/>
                                             </p:txEl>
@@ -10335,7 +10335,7 @@
                                       <p:cBhvr>
                                         <p:cTn id="32" dur="100"/>
                                         <p:tgtEl>
-                                          <p:spTgt spid="133">
+                                          <p:spTgt spid="136">
                                             <p:txEl>
                                               <p:pRg st="5" end="5"/>
                                             </p:txEl>
@@ -10378,7 +10378,7 @@
                                           </p:stCondLst>
                                         </p:cTn>
                                         <p:tgtEl>
-                                          <p:spTgt spid="133">
+                                          <p:spTgt spid="136">
                                             <p:txEl>
                                               <p:pRg st="6" end="6"/>
                                             </p:txEl>
@@ -10396,7 +10396,7 @@
                                       <p:cBhvr>
                                         <p:cTn id="37" dur="100"/>
                                         <p:tgtEl>
-                                          <p:spTgt spid="133">
+                                          <p:spTgt spid="136">
                                             <p:txEl>
                                               <p:pRg st="6" end="6"/>
                                             </p:txEl>
@@ -10439,7 +10439,7 @@
                                           </p:stCondLst>
                                         </p:cTn>
                                         <p:tgtEl>
-                                          <p:spTgt spid="133">
+                                          <p:spTgt spid="136">
                                             <p:txEl>
                                               <p:pRg st="7" end="7"/>
                                             </p:txEl>
@@ -10457,7 +10457,7 @@
                                       <p:cBhvr>
                                         <p:cTn id="42" dur="100"/>
                                         <p:tgtEl>
-                                          <p:spTgt spid="133">
+                                          <p:spTgt spid="136">
                                             <p:txEl>
                                               <p:pRg st="7" end="7"/>
                                             </p:txEl>
@@ -10500,7 +10500,7 @@
                                           </p:stCondLst>
                                         </p:cTn>
                                         <p:tgtEl>
-                                          <p:spTgt spid="133">
+                                          <p:spTgt spid="136">
                                             <p:txEl>
                                               <p:pRg st="8" end="8"/>
                                             </p:txEl>
@@ -10518,7 +10518,7 @@
                                       <p:cBhvr>
                                         <p:cTn id="47" dur="100"/>
                                         <p:tgtEl>
-                                          <p:spTgt spid="133">
+                                          <p:spTgt spid="136">
                                             <p:txEl>
                                               <p:pRg st="8" end="8"/>
                                             </p:txEl>
@@ -10561,7 +10561,7 @@
                                           </p:stCondLst>
                                         </p:cTn>
                                         <p:tgtEl>
-                                          <p:spTgt spid="134">
+                                          <p:spTgt spid="137">
                                             <p:txEl>
                                               <p:pRg st="0" end="0"/>
                                             </p:txEl>
@@ -10579,7 +10579,7 @@
                                       <p:cBhvr>
                                         <p:cTn id="52" dur="100"/>
                                         <p:tgtEl>
-                                          <p:spTgt spid="134">
+                                          <p:spTgt spid="137">
                                             <p:txEl>
                                               <p:pRg st="0" end="0"/>
                                             </p:txEl>
@@ -10622,7 +10622,7 @@
                                           </p:stCondLst>
                                         </p:cTn>
                                         <p:tgtEl>
-                                          <p:spTgt spid="134">
+                                          <p:spTgt spid="137">
                                             <p:txEl>
                                               <p:pRg st="1" end="1"/>
                                             </p:txEl>
@@ -10640,7 +10640,7 @@
                                       <p:cBhvr>
                                         <p:cTn id="57" dur="100"/>
                                         <p:tgtEl>
-                                          <p:spTgt spid="134">
+                                          <p:spTgt spid="137">
                                             <p:txEl>
                                               <p:pRg st="1" end="1"/>
                                             </p:txEl>
@@ -10683,7 +10683,7 @@
                                           </p:stCondLst>
                                         </p:cTn>
                                         <p:tgtEl>
-                                          <p:spTgt spid="134">
+                                          <p:spTgt spid="137">
                                             <p:txEl>
                                               <p:pRg st="2" end="2"/>
                                             </p:txEl>
@@ -10701,7 +10701,7 @@
                                       <p:cBhvr>
                                         <p:cTn id="62" dur="100"/>
                                         <p:tgtEl>
-                                          <p:spTgt spid="134">
+                                          <p:spTgt spid="137">
                                             <p:txEl>
                                               <p:pRg st="2" end="2"/>
                                             </p:txEl>
@@ -10744,7 +10744,7 @@
                                           </p:stCondLst>
                                         </p:cTn>
                                         <p:tgtEl>
-                                          <p:spTgt spid="134">
+                                          <p:spTgt spid="137">
                                             <p:txEl>
                                               <p:pRg st="3" end="3"/>
                                             </p:txEl>
@@ -10762,7 +10762,7 @@
                                       <p:cBhvr>
                                         <p:cTn id="67" dur="100"/>
                                         <p:tgtEl>
-                                          <p:spTgt spid="134">
+                                          <p:spTgt spid="137">
                                             <p:txEl>
                                               <p:pRg st="3" end="3"/>
                                             </p:txEl>
@@ -10805,7 +10805,7 @@
                                           </p:stCondLst>
                                         </p:cTn>
                                         <p:tgtEl>
-                                          <p:spTgt spid="134">
+                                          <p:spTgt spid="137">
                                             <p:txEl>
                                               <p:pRg st="4" end="4"/>
                                             </p:txEl>
@@ -10823,7 +10823,7 @@
                                       <p:cBhvr>
                                         <p:cTn id="72" dur="100"/>
                                         <p:tgtEl>
-                                          <p:spTgt spid="134">
+                                          <p:spTgt spid="137">
                                             <p:txEl>
                                               <p:pRg st="4" end="4"/>
                                             </p:txEl>
@@ -10866,7 +10866,7 @@
                                           </p:stCondLst>
                                         </p:cTn>
                                         <p:tgtEl>
-                                          <p:spTgt spid="134">
+                                          <p:spTgt spid="137">
                                             <p:txEl>
                                               <p:pRg st="5" end="5"/>
                                             </p:txEl>
@@ -10884,7 +10884,7 @@
                                       <p:cBhvr>
                                         <p:cTn id="77" dur="100"/>
                                         <p:tgtEl>
-                                          <p:spTgt spid="134">
+                                          <p:spTgt spid="137">
                                             <p:txEl>
                                               <p:pRg st="5" end="5"/>
                                             </p:txEl>
@@ -10927,7 +10927,7 @@
                                           </p:stCondLst>
                                         </p:cTn>
                                         <p:tgtEl>
-                                          <p:spTgt spid="134">
+                                          <p:spTgt spid="137">
                                             <p:txEl>
                                               <p:pRg st="6" end="6"/>
                                             </p:txEl>
@@ -10945,7 +10945,7 @@
                                       <p:cBhvr>
                                         <p:cTn id="82" dur="100"/>
                                         <p:tgtEl>
-                                          <p:spTgt spid="134">
+                                          <p:spTgt spid="137">
                                             <p:txEl>
                                               <p:pRg st="6" end="6"/>
                                             </p:txEl>
@@ -10988,7 +10988,7 @@
                                           </p:stCondLst>
                                         </p:cTn>
                                         <p:tgtEl>
-                                          <p:spTgt spid="134">
+                                          <p:spTgt spid="137">
                                             <p:txEl>
                                               <p:pRg st="7" end="7"/>
                                             </p:txEl>
@@ -11006,7 +11006,7 @@
                                       <p:cBhvr>
                                         <p:cTn id="87" dur="100"/>
                                         <p:tgtEl>
-                                          <p:spTgt spid="134">
+                                          <p:spTgt spid="137">
                                             <p:txEl>
                                               <p:pRg st="7" end="7"/>
                                             </p:txEl>
@@ -11049,7 +11049,7 @@
                                           </p:stCondLst>
                                         </p:cTn>
                                         <p:tgtEl>
-                                          <p:spTgt spid="134">
+                                          <p:spTgt spid="137">
                                             <p:txEl>
                                               <p:pRg st="8" end="8"/>
                                             </p:txEl>
@@ -11067,7 +11067,7 @@
                                       <p:cBhvr>
                                         <p:cTn id="92" dur="100"/>
                                         <p:tgtEl>
-                                          <p:spTgt spid="134">
+                                          <p:spTgt spid="137">
                                             <p:txEl>
                                               <p:pRg st="8" end="8"/>
                                             </p:txEl>
@@ -11110,7 +11110,7 @@
                                           </p:stCondLst>
                                         </p:cTn>
                                         <p:tgtEl>
-                                          <p:spTgt spid="134">
+                                          <p:spTgt spid="137">
                                             <p:txEl>
                                               <p:pRg st="9" end="9"/>
                                             </p:txEl>
@@ -11128,7 +11128,7 @@
                                       <p:cBhvr>
                                         <p:cTn id="97" dur="100"/>
                                         <p:tgtEl>
-                                          <p:spTgt spid="134">
+                                          <p:spTgt spid="137">
                                             <p:txEl>
                                               <p:pRg st="9" end="9"/>
                                             </p:txEl>
@@ -11175,7 +11175,7 @@
   <p:cSld>
     <p:spTree>
       <p:nvGrpSpPr>
-        <p:cNvPr id="1" name="Shape 138"/>
+        <p:cNvPr id="1" name="Shape 141"/>
         <p:cNvGrpSpPr/>
         <p:nvPr/>
       </p:nvGrpSpPr>
@@ -11189,7 +11189,7 @@
       </p:grpSpPr>
       <p:sp>
         <p:nvSpPr>
-          <p:cNvPr id="139" name="Google Shape;139;p26"/>
+          <p:cNvPr id="142" name="Google Shape;142;p26"/>
           <p:cNvSpPr txBox="1">
             <a:spLocks noGrp="1"/>
           </p:cNvSpPr>
@@ -11231,7 +11231,7 @@
       </p:sp>
       <p:sp>
         <p:nvSpPr>
-          <p:cNvPr id="140" name="Google Shape;140;p26"/>
+          <p:cNvPr id="143" name="Google Shape;143;p26"/>
           <p:cNvSpPr txBox="1">
             <a:spLocks noGrp="1"/>
           </p:cNvSpPr>
@@ -11507,7 +11507,7 @@
       </p:sp>
       <p:sp>
         <p:nvSpPr>
-          <p:cNvPr id="141" name="Google Shape;141;p26"/>
+          <p:cNvPr id="144" name="Google Shape;144;p26"/>
           <p:cNvSpPr txBox="1">
             <a:spLocks noGrp="1"/>
           </p:cNvSpPr>
@@ -11706,7 +11706,7 @@
                                           </p:stCondLst>
                                         </p:cTn>
                                         <p:tgtEl>
-                                          <p:spTgt spid="140">
+                                          <p:spTgt spid="143">
                                             <p:txEl>
                                               <p:pRg st="0" end="0"/>
                                             </p:txEl>
@@ -11724,7 +11724,7 @@
                                       <p:cBhvr>
                                         <p:cTn id="7" dur="100"/>
                                         <p:tgtEl>
-                                          <p:spTgt spid="140">
+                                          <p:spTgt spid="143">
                                             <p:txEl>
                                               <p:pRg st="0" end="0"/>
                                             </p:txEl>
@@ -11767,7 +11767,7 @@
                                           </p:stCondLst>
                                         </p:cTn>
                                         <p:tgtEl>
-                                          <p:spTgt spid="140">
+                                          <p:spTgt spid="143">
                                             <p:txEl>
                                               <p:pRg st="1" end="1"/>
                                             </p:txEl>
@@ -11785,7 +11785,7 @@
                                       <p:cBhvr>
                                         <p:cTn id="12" dur="100"/>
                                         <p:tgtEl>
-                                          <p:spTgt spid="140">
+                                          <p:spTgt spid="143">
                                             <p:txEl>
                                               <p:pRg st="1" end="1"/>
                                             </p:txEl>
@@ -11828,7 +11828,7 @@
                                           </p:stCondLst>
                                         </p:cTn>
                                         <p:tgtEl>
-                                          <p:spTgt spid="140">
+                                          <p:spTgt spid="143">
                                             <p:txEl>
                                               <p:pRg st="2" end="2"/>
                                             </p:txEl>
@@ -11846,7 +11846,7 @@
                                       <p:cBhvr>
                                         <p:cTn id="17" dur="100"/>
                                         <p:tgtEl>
-                                          <p:spTgt spid="140">
+                                          <p:spTgt spid="143">
                                             <p:txEl>
                                               <p:pRg st="2" end="2"/>
                                             </p:txEl>
@@ -11889,7 +11889,7 @@
                                           </p:stCondLst>
                                         </p:cTn>
                                         <p:tgtEl>
-                                          <p:spTgt spid="140">
+                                          <p:spTgt spid="143">
                                             <p:txEl>
                                               <p:pRg st="3" end="3"/>
                                             </p:txEl>
@@ -11907,7 +11907,7 @@
                                       <p:cBhvr>
                                         <p:cTn id="22" dur="100"/>
                                         <p:tgtEl>
-                                          <p:spTgt spid="140">
+                                          <p:spTgt spid="143">
                                             <p:txEl>
                                               <p:pRg st="3" end="3"/>
                                             </p:txEl>
@@ -11950,7 +11950,7 @@
                                           </p:stCondLst>
                                         </p:cTn>
                                         <p:tgtEl>
-                                          <p:spTgt spid="140">
+                                          <p:spTgt spid="143">
                                             <p:txEl>
                                               <p:pRg st="4" end="4"/>
                                             </p:txEl>
@@ -11968,7 +11968,7 @@
                                       <p:cBhvr>
                                         <p:cTn id="27" dur="100"/>
                                         <p:tgtEl>
-                                          <p:spTgt spid="140">
+                                          <p:spTgt spid="143">
                                             <p:txEl>
                                               <p:pRg st="4" end="4"/>
                                             </p:txEl>
@@ -12011,7 +12011,7 @@
                                           </p:stCondLst>
                                         </p:cTn>
                                         <p:tgtEl>
-                                          <p:spTgt spid="140">
+                                          <p:spTgt spid="143">
                                             <p:txEl>
                                               <p:pRg st="5" end="5"/>
                                             </p:txEl>
@@ -12029,7 +12029,7 @@
                                       <p:cBhvr>
                                         <p:cTn id="32" dur="100"/>
                                         <p:tgtEl>
-                                          <p:spTgt spid="140">
+                                          <p:spTgt spid="143">
                                             <p:txEl>
                                               <p:pRg st="5" end="5"/>
                                             </p:txEl>
@@ -12072,7 +12072,7 @@
                                           </p:stCondLst>
                                         </p:cTn>
                                         <p:tgtEl>
-                                          <p:spTgt spid="140">
+                                          <p:spTgt spid="143">
                                             <p:txEl>
                                               <p:pRg st="6" end="6"/>
                                             </p:txEl>
@@ -12090,7 +12090,7 @@
                                       <p:cBhvr>
                                         <p:cTn id="37" dur="100"/>
                                         <p:tgtEl>
-                                          <p:spTgt spid="140">
+                                          <p:spTgt spid="143">
                                             <p:txEl>
                                               <p:pRg st="6" end="6"/>
                                             </p:txEl>
@@ -12133,7 +12133,7 @@
                                           </p:stCondLst>
                                         </p:cTn>
                                         <p:tgtEl>
-                                          <p:spTgt spid="140">
+                                          <p:spTgt spid="143">
                                             <p:txEl>
                                               <p:pRg st="7" end="7"/>
                                             </p:txEl>
@@ -12151,7 +12151,7 @@
                                       <p:cBhvr>
                                         <p:cTn id="42" dur="100"/>
                                         <p:tgtEl>
-                                          <p:spTgt spid="140">
+                                          <p:spTgt spid="143">
                                             <p:txEl>
                                               <p:pRg st="7" end="7"/>
                                             </p:txEl>
@@ -12194,7 +12194,7 @@
                                           </p:stCondLst>
                                         </p:cTn>
                                         <p:tgtEl>
-                                          <p:spTgt spid="140">
+                                          <p:spTgt spid="143">
                                             <p:txEl>
                                               <p:pRg st="8" end="8"/>
                                             </p:txEl>
@@ -12212,7 +12212,7 @@
                                       <p:cBhvr>
                                         <p:cTn id="47" dur="100"/>
                                         <p:tgtEl>
-                                          <p:spTgt spid="140">
+                                          <p:spTgt spid="143">
                                             <p:txEl>
                                               <p:pRg st="8" end="8"/>
                                             </p:txEl>
@@ -12255,7 +12255,7 @@
                                           </p:stCondLst>
                                         </p:cTn>
                                         <p:tgtEl>
-                                          <p:spTgt spid="141">
+                                          <p:spTgt spid="144">
                                             <p:txEl>
                                               <p:pRg st="0" end="0"/>
                                             </p:txEl>
@@ -12273,7 +12273,7 @@
                                       <p:cBhvr>
                                         <p:cTn id="52" dur="100"/>
                                         <p:tgtEl>
-                                          <p:spTgt spid="141">
+                                          <p:spTgt spid="144">
                                             <p:txEl>
                                               <p:pRg st="0" end="0"/>
                                             </p:txEl>
@@ -12316,7 +12316,7 @@
                                           </p:stCondLst>
                                         </p:cTn>
                                         <p:tgtEl>
-                                          <p:spTgt spid="141">
+                                          <p:spTgt spid="144">
                                             <p:txEl>
                                               <p:pRg st="1" end="1"/>
                                             </p:txEl>
@@ -12334,7 +12334,7 @@
                                       <p:cBhvr>
                                         <p:cTn id="57" dur="100"/>
                                         <p:tgtEl>
-                                          <p:spTgt spid="141">
+                                          <p:spTgt spid="144">
                                             <p:txEl>
                                               <p:pRg st="1" end="1"/>
                                             </p:txEl>
@@ -12377,7 +12377,7 @@
                                           </p:stCondLst>
                                         </p:cTn>
                                         <p:tgtEl>
-                                          <p:spTgt spid="141">
+                                          <p:spTgt spid="144">
                                             <p:txEl>
                                               <p:pRg st="2" end="2"/>
                                             </p:txEl>
@@ -12395,7 +12395,7 @@
                                       <p:cBhvr>
                                         <p:cTn id="62" dur="100"/>
                                         <p:tgtEl>
-                                          <p:spTgt spid="141">
+                                          <p:spTgt spid="144">
                                             <p:txEl>
                                               <p:pRg st="2" end="2"/>
                                             </p:txEl>
@@ -12438,7 +12438,7 @@
                                           </p:stCondLst>
                                         </p:cTn>
                                         <p:tgtEl>
-                                          <p:spTgt spid="141">
+                                          <p:spTgt spid="144">
                                             <p:txEl>
                                               <p:pRg st="3" end="3"/>
                                             </p:txEl>
@@ -12456,7 +12456,7 @@
                                       <p:cBhvr>
                                         <p:cTn id="67" dur="100"/>
                                         <p:tgtEl>
-                                          <p:spTgt spid="141">
+                                          <p:spTgt spid="144">
                                             <p:txEl>
                                               <p:pRg st="3" end="3"/>
                                             </p:txEl>
@@ -12499,7 +12499,7 @@
                                           </p:stCondLst>
                                         </p:cTn>
                                         <p:tgtEl>
-                                          <p:spTgt spid="141">
+                                          <p:spTgt spid="144">
                                             <p:txEl>
                                               <p:pRg st="4" end="4"/>
                                             </p:txEl>
@@ -12517,7 +12517,7 @@
                                       <p:cBhvr>
                                         <p:cTn id="72" dur="100"/>
                                         <p:tgtEl>
-                                          <p:spTgt spid="141">
+                                          <p:spTgt spid="144">
                                             <p:txEl>
                                               <p:pRg st="4" end="4"/>
                                             </p:txEl>
@@ -12560,7 +12560,7 @@
                                           </p:stCondLst>
                                         </p:cTn>
                                         <p:tgtEl>
-                                          <p:spTgt spid="141">
+                                          <p:spTgt spid="144">
                                             <p:txEl>
                                               <p:pRg st="5" end="5"/>
                                             </p:txEl>
@@ -12578,7 +12578,7 @@
                                       <p:cBhvr>
                                         <p:cTn id="77" dur="100"/>
                                         <p:tgtEl>
-                                          <p:spTgt spid="141">
+                                          <p:spTgt spid="144">
                                             <p:txEl>
                                               <p:pRg st="5" end="5"/>
                                             </p:txEl>
@@ -12625,7 +12625,7 @@
   <p:cSld>
     <p:spTree>
       <p:nvGrpSpPr>
-        <p:cNvPr id="1" name="Shape 145"/>
+        <p:cNvPr id="1" name="Shape 148"/>
         <p:cNvGrpSpPr/>
         <p:nvPr/>
       </p:nvGrpSpPr>
@@ -12639,7 +12639,7 @@
       </p:grpSpPr>
       <p:sp>
         <p:nvSpPr>
-          <p:cNvPr id="146" name="Google Shape;146;p27"/>
+          <p:cNvPr id="149" name="Google Shape;149;p27"/>
           <p:cNvSpPr txBox="1">
             <a:spLocks noGrp="1"/>
           </p:cNvSpPr>
@@ -12681,7 +12681,7 @@
       </p:sp>
       <p:sp>
         <p:nvSpPr>
-          <p:cNvPr id="147" name="Google Shape;147;p27"/>
+          <p:cNvPr id="150" name="Google Shape;150;p27"/>
           <p:cNvSpPr txBox="1">
             <a:spLocks noGrp="1"/>
           </p:cNvSpPr>
@@ -12714,14 +12714,14 @@
               <a:buNone/>
             </a:pPr>
             <a:r>
-              <a:rPr lang="en" sz="1600" dirty="0">
+              <a:rPr lang="en" sz="1600">
                 <a:solidFill>
                   <a:schemeClr val="dk1"/>
                 </a:solidFill>
               </a:rPr>
               <a:t>Instead of passing ownership, we pass a reference to the value.</a:t>
             </a:r>
-            <a:endParaRPr sz="1600" dirty="0">
+            <a:endParaRPr sz="1600">
               <a:solidFill>
                 <a:schemeClr val="dk1"/>
               </a:solidFill>
@@ -12738,7 +12738,7 @@
               <a:buNone/>
             </a:pPr>
             <a:r>
-              <a:rPr lang="en" sz="1600" dirty="0">
+              <a:rPr lang="en" sz="1600">
                 <a:solidFill>
                   <a:schemeClr val="dk1"/>
                 </a:solidFill>
@@ -12746,7 +12746,7 @@
               <a:t>Syntax: </a:t>
             </a:r>
             <a:r>
-              <a:rPr lang="en" sz="1600" dirty="0">
+              <a:rPr lang="en" sz="1600">
                 <a:solidFill>
                   <a:srgbClr val="000000"/>
                 </a:solidFill>
@@ -12756,7 +12756,7 @@
               </a:rPr>
               <a:t>    borrows(&amp;s);  // s still valid</a:t>
             </a:r>
-            <a:endParaRPr sz="1600" dirty="0">
+            <a:endParaRPr sz="1600">
               <a:solidFill>
                 <a:srgbClr val="000000"/>
               </a:solidFill>
@@ -12776,14 +12776,14 @@
               <a:buNone/>
             </a:pPr>
             <a:r>
-              <a:rPr lang="en" sz="1600" dirty="0">
+              <a:rPr lang="en" sz="1600">
                 <a:solidFill>
                   <a:schemeClr val="dk1"/>
                 </a:solidFill>
               </a:rPr>
               <a:t>Function signature changed to accept reference</a:t>
             </a:r>
-            <a:endParaRPr sz="1600" dirty="0">
+            <a:endParaRPr sz="1600">
               <a:solidFill>
                 <a:srgbClr val="000000"/>
               </a:solidFill>
@@ -12806,7 +12806,7 @@
               <a:buNone/>
             </a:pPr>
             <a:r>
-              <a:rPr lang="en" sz="1600" dirty="0">
+              <a:rPr lang="en" sz="1600">
                 <a:solidFill>
                   <a:srgbClr val="000000"/>
                 </a:solidFill>
@@ -12816,7 +12816,7 @@
               </a:rPr>
               <a:t>    fn borrows(str: &amp;String) {  }</a:t>
             </a:r>
-            <a:endParaRPr sz="1600" dirty="0">
+            <a:endParaRPr sz="1600">
               <a:solidFill>
                 <a:srgbClr val="000000"/>
               </a:solidFill>
@@ -12835,7 +12835,7 @@
               </a:spcAft>
               <a:buNone/>
             </a:pPr>
-            <a:endParaRPr sz="1600" dirty="0">
+            <a:endParaRPr sz="1600">
               <a:solidFill>
                 <a:srgbClr val="000000"/>
               </a:solidFill>
@@ -12845,27 +12845,30 @@
             </a:endParaRPr>
           </a:p>
           <a:p>
-            <a:pPr marL="0" lvl="0" indent="0">
+            <a:pPr marL="0" lvl="0" indent="0" algn="l" rtl="0">
+              <a:spcBef>
+                <a:spcPts val="0"/>
+              </a:spcBef>
               <a:spcAft>
                 <a:spcPts val="1200"/>
               </a:spcAft>
               <a:buNone/>
             </a:pPr>
             <a:r>
-              <a:rPr lang="en-US" sz="1600" dirty="0">
+              <a:rPr lang="en" sz="1600">
                 <a:solidFill>
                   <a:schemeClr val="dk1"/>
                 </a:solidFill>
               </a:rPr>
               <a:t>Common functionality retained with a single owner</a:t>
             </a:r>
-            <a:endParaRPr dirty="0"/>
+            <a:endParaRPr/>
           </a:p>
         </p:txBody>
       </p:sp>
       <p:sp>
         <p:nvSpPr>
-          <p:cNvPr id="148" name="Google Shape;148;p27"/>
+          <p:cNvPr id="151" name="Google Shape;151;p27"/>
           <p:cNvSpPr txBox="1">
             <a:spLocks noGrp="1"/>
           </p:cNvSpPr>
@@ -13104,7 +13107,7 @@
                                           </p:stCondLst>
                                         </p:cTn>
                                         <p:tgtEl>
-                                          <p:spTgt spid="147">
+                                          <p:spTgt spid="150">
                                             <p:txEl>
                                               <p:pRg st="0" end="0"/>
                                             </p:txEl>
@@ -13122,7 +13125,7 @@
                                       <p:cBhvr>
                                         <p:cTn id="7" dur="100"/>
                                         <p:tgtEl>
-                                          <p:spTgt spid="147">
+                                          <p:spTgt spid="150">
                                             <p:txEl>
                                               <p:pRg st="0" end="0"/>
                                             </p:txEl>
@@ -13165,7 +13168,7 @@
                                           </p:stCondLst>
                                         </p:cTn>
                                         <p:tgtEl>
-                                          <p:spTgt spid="147">
+                                          <p:spTgt spid="150">
                                             <p:txEl>
                                               <p:pRg st="1" end="1"/>
                                             </p:txEl>
@@ -13183,7 +13186,7 @@
                                       <p:cBhvr>
                                         <p:cTn id="12" dur="100"/>
                                         <p:tgtEl>
-                                          <p:spTgt spid="147">
+                                          <p:spTgt spid="150">
                                             <p:txEl>
                                               <p:pRg st="1" end="1"/>
                                             </p:txEl>
@@ -13226,7 +13229,7 @@
                                           </p:stCondLst>
                                         </p:cTn>
                                         <p:tgtEl>
-                                          <p:spTgt spid="147">
+                                          <p:spTgt spid="150">
                                             <p:txEl>
                                               <p:pRg st="2" end="2"/>
                                             </p:txEl>
@@ -13244,7 +13247,7 @@
                                       <p:cBhvr>
                                         <p:cTn id="17" dur="100"/>
                                         <p:tgtEl>
-                                          <p:spTgt spid="147">
+                                          <p:spTgt spid="150">
                                             <p:txEl>
                                               <p:pRg st="2" end="2"/>
                                             </p:txEl>
@@ -13287,7 +13290,7 @@
                                           </p:stCondLst>
                                         </p:cTn>
                                         <p:tgtEl>
-                                          <p:spTgt spid="147">
+                                          <p:spTgt spid="150">
                                             <p:txEl>
                                               <p:pRg st="3" end="3"/>
                                             </p:txEl>
@@ -13305,7 +13308,7 @@
                                       <p:cBhvr>
                                         <p:cTn id="22" dur="100"/>
                                         <p:tgtEl>
-                                          <p:spTgt spid="147">
+                                          <p:spTgt spid="150">
                                             <p:txEl>
                                               <p:pRg st="3" end="3"/>
                                             </p:txEl>
@@ -13348,9 +13351,9 @@
                                           </p:stCondLst>
                                         </p:cTn>
                                         <p:tgtEl>
-                                          <p:spTgt spid="148">
-                                            <p:txEl>
-                                              <p:pRg st="0" end="0"/>
+                                          <p:spTgt spid="150">
+                                            <p:txEl>
+                                              <p:pRg st="4" end="4"/>
                                             </p:txEl>
                                           </p:spTgt>
                                         </p:tgtEl>
@@ -13366,9 +13369,9 @@
                                       <p:cBhvr>
                                         <p:cTn id="27" dur="100"/>
                                         <p:tgtEl>
-                                          <p:spTgt spid="148">
-                                            <p:txEl>
-                                              <p:pRg st="0" end="0"/>
+                                          <p:spTgt spid="150">
+                                            <p:txEl>
+                                              <p:pRg st="4" end="4"/>
                                             </p:txEl>
                                           </p:spTgt>
                                         </p:tgtEl>
@@ -13409,9 +13412,9 @@
                                           </p:stCondLst>
                                         </p:cTn>
                                         <p:tgtEl>
-                                          <p:spTgt spid="148">
-                                            <p:txEl>
-                                              <p:pRg st="1" end="1"/>
+                                          <p:spTgt spid="150">
+                                            <p:txEl>
+                                              <p:pRg st="5" end="5"/>
                                             </p:txEl>
                                           </p:spTgt>
                                         </p:tgtEl>
@@ -13427,9 +13430,9 @@
                                       <p:cBhvr>
                                         <p:cTn id="32" dur="100"/>
                                         <p:tgtEl>
-                                          <p:spTgt spid="148">
-                                            <p:txEl>
-                                              <p:pRg st="1" end="1"/>
+                                          <p:spTgt spid="150">
+                                            <p:txEl>
+                                              <p:pRg st="5" end="5"/>
                                             </p:txEl>
                                           </p:spTgt>
                                         </p:tgtEl>
@@ -13470,9 +13473,9 @@
                                           </p:stCondLst>
                                         </p:cTn>
                                         <p:tgtEl>
-                                          <p:spTgt spid="148">
-                                            <p:txEl>
-                                              <p:pRg st="2" end="2"/>
+                                          <p:spTgt spid="151">
+                                            <p:txEl>
+                                              <p:pRg st="0" end="0"/>
                                             </p:txEl>
                                           </p:spTgt>
                                         </p:tgtEl>
@@ -13488,9 +13491,9 @@
                                       <p:cBhvr>
                                         <p:cTn id="37" dur="100"/>
                                         <p:tgtEl>
-                                          <p:spTgt spid="148">
-                                            <p:txEl>
-                                              <p:pRg st="2" end="2"/>
+                                          <p:spTgt spid="151">
+                                            <p:txEl>
+                                              <p:pRg st="0" end="0"/>
                                             </p:txEl>
                                           </p:spTgt>
                                         </p:tgtEl>
@@ -13531,9 +13534,9 @@
                                           </p:stCondLst>
                                         </p:cTn>
                                         <p:tgtEl>
-                                          <p:spTgt spid="148">
-                                            <p:txEl>
-                                              <p:pRg st="3" end="3"/>
+                                          <p:spTgt spid="151">
+                                            <p:txEl>
+                                              <p:pRg st="1" end="1"/>
                                             </p:txEl>
                                           </p:spTgt>
                                         </p:tgtEl>
@@ -13549,9 +13552,9 @@
                                       <p:cBhvr>
                                         <p:cTn id="42" dur="100"/>
                                         <p:tgtEl>
-                                          <p:spTgt spid="148">
-                                            <p:txEl>
-                                              <p:pRg st="3" end="3"/>
+                                          <p:spTgt spid="151">
+                                            <p:txEl>
+                                              <p:pRg st="1" end="1"/>
                                             </p:txEl>
                                           </p:spTgt>
                                         </p:tgtEl>
@@ -13592,9 +13595,9 @@
                                           </p:stCondLst>
                                         </p:cTn>
                                         <p:tgtEl>
-                                          <p:spTgt spid="148">
-                                            <p:txEl>
-                                              <p:pRg st="4" end="4"/>
+                                          <p:spTgt spid="151">
+                                            <p:txEl>
+                                              <p:pRg st="2" end="2"/>
                                             </p:txEl>
                                           </p:spTgt>
                                         </p:tgtEl>
@@ -13610,9 +13613,9 @@
                                       <p:cBhvr>
                                         <p:cTn id="47" dur="100"/>
                                         <p:tgtEl>
-                                          <p:spTgt spid="148">
-                                            <p:txEl>
-                                              <p:pRg st="4" end="4"/>
+                                          <p:spTgt spid="151">
+                                            <p:txEl>
+                                              <p:pRg st="2" end="2"/>
                                             </p:txEl>
                                           </p:spTgt>
                                         </p:tgtEl>
@@ -13653,9 +13656,9 @@
                                           </p:stCondLst>
                                         </p:cTn>
                                         <p:tgtEl>
-                                          <p:spTgt spid="148">
-                                            <p:txEl>
-                                              <p:pRg st="5" end="5"/>
+                                          <p:spTgt spid="151">
+                                            <p:txEl>
+                                              <p:pRg st="3" end="3"/>
                                             </p:txEl>
                                           </p:spTgt>
                                         </p:tgtEl>
@@ -13671,9 +13674,9 @@
                                       <p:cBhvr>
                                         <p:cTn id="52" dur="100"/>
                                         <p:tgtEl>
-                                          <p:spTgt spid="148">
-                                            <p:txEl>
-                                              <p:pRg st="5" end="5"/>
+                                          <p:spTgt spid="151">
+                                            <p:txEl>
+                                              <p:pRg st="3" end="3"/>
                                             </p:txEl>
                                           </p:spTgt>
                                         </p:tgtEl>
@@ -13714,9 +13717,9 @@
                                           </p:stCondLst>
                                         </p:cTn>
                                         <p:tgtEl>
-                                          <p:spTgt spid="148">
-                                            <p:txEl>
-                                              <p:pRg st="6" end="6"/>
+                                          <p:spTgt spid="151">
+                                            <p:txEl>
+                                              <p:pRg st="4" end="4"/>
                                             </p:txEl>
                                           </p:spTgt>
                                         </p:tgtEl>
@@ -13732,9 +13735,9 @@
                                       <p:cBhvr>
                                         <p:cTn id="57" dur="100"/>
                                         <p:tgtEl>
-                                          <p:spTgt spid="148">
-                                            <p:txEl>
-                                              <p:pRg st="6" end="6"/>
+                                          <p:spTgt spid="151">
+                                            <p:txEl>
+                                              <p:pRg st="4" end="4"/>
                                             </p:txEl>
                                           </p:spTgt>
                                         </p:tgtEl>
@@ -13775,9 +13778,9 @@
                                           </p:stCondLst>
                                         </p:cTn>
                                         <p:tgtEl>
-                                          <p:spTgt spid="148">
-                                            <p:txEl>
-                                              <p:pRg st="7" end="7"/>
+                                          <p:spTgt spid="151">
+                                            <p:txEl>
+                                              <p:pRg st="5" end="5"/>
                                             </p:txEl>
                                           </p:spTgt>
                                         </p:tgtEl>
@@ -13793,7 +13796,129 @@
                                       <p:cBhvr>
                                         <p:cTn id="62" dur="100"/>
                                         <p:tgtEl>
-                                          <p:spTgt spid="148">
+                                          <p:spTgt spid="151">
+                                            <p:txEl>
+                                              <p:pRg st="5" end="5"/>
+                                            </p:txEl>
+                                          </p:spTgt>
+                                        </p:tgtEl>
+                                      </p:cBhvr>
+                                    </p:animEffect>
+                                  </p:childTnLst>
+                                </p:cTn>
+                              </p:par>
+                            </p:childTnLst>
+                          </p:cTn>
+                        </p:par>
+                      </p:childTnLst>
+                    </p:cTn>
+                  </p:par>
+                  <p:par>
+                    <p:cTn id="63" fill="hold">
+                      <p:stCondLst>
+                        <p:cond delay="indefinite"/>
+                      </p:stCondLst>
+                      <p:childTnLst>
+                        <p:par>
+                          <p:cTn id="64" fill="hold">
+                            <p:stCondLst>
+                              <p:cond delay="0"/>
+                            </p:stCondLst>
+                            <p:childTnLst>
+                              <p:par>
+                                <p:cTn id="65" presetID="10" presetClass="entr" presetSubtype="0" fill="hold" nodeType="clickEffect">
+                                  <p:stCondLst>
+                                    <p:cond delay="0"/>
+                                  </p:stCondLst>
+                                  <p:childTnLst>
+                                    <p:set>
+                                      <p:cBhvr>
+                                        <p:cTn id="66" dur="1" fill="hold">
+                                          <p:stCondLst>
+                                            <p:cond delay="0"/>
+                                          </p:stCondLst>
+                                        </p:cTn>
+                                        <p:tgtEl>
+                                          <p:spTgt spid="151">
+                                            <p:txEl>
+                                              <p:pRg st="6" end="6"/>
+                                            </p:txEl>
+                                          </p:spTgt>
+                                        </p:tgtEl>
+                                        <p:attrNameLst>
+                                          <p:attrName>style.visibility</p:attrName>
+                                        </p:attrNameLst>
+                                      </p:cBhvr>
+                                      <p:to>
+                                        <p:strVal val="visible"/>
+                                      </p:to>
+                                    </p:set>
+                                    <p:animEffect transition="in" filter="fade">
+                                      <p:cBhvr>
+                                        <p:cTn id="67" dur="100"/>
+                                        <p:tgtEl>
+                                          <p:spTgt spid="151">
+                                            <p:txEl>
+                                              <p:pRg st="6" end="6"/>
+                                            </p:txEl>
+                                          </p:spTgt>
+                                        </p:tgtEl>
+                                      </p:cBhvr>
+                                    </p:animEffect>
+                                  </p:childTnLst>
+                                </p:cTn>
+                              </p:par>
+                            </p:childTnLst>
+                          </p:cTn>
+                        </p:par>
+                      </p:childTnLst>
+                    </p:cTn>
+                  </p:par>
+                  <p:par>
+                    <p:cTn id="68" fill="hold">
+                      <p:stCondLst>
+                        <p:cond delay="indefinite"/>
+                      </p:stCondLst>
+                      <p:childTnLst>
+                        <p:par>
+                          <p:cTn id="69" fill="hold">
+                            <p:stCondLst>
+                              <p:cond delay="0"/>
+                            </p:stCondLst>
+                            <p:childTnLst>
+                              <p:par>
+                                <p:cTn id="70" presetID="10" presetClass="entr" presetSubtype="0" fill="hold" nodeType="clickEffect">
+                                  <p:stCondLst>
+                                    <p:cond delay="0"/>
+                                  </p:stCondLst>
+                                  <p:childTnLst>
+                                    <p:set>
+                                      <p:cBhvr>
+                                        <p:cTn id="71" dur="1" fill="hold">
+                                          <p:stCondLst>
+                                            <p:cond delay="0"/>
+                                          </p:stCondLst>
+                                        </p:cTn>
+                                        <p:tgtEl>
+                                          <p:spTgt spid="151">
+                                            <p:txEl>
+                                              <p:pRg st="7" end="7"/>
+                                            </p:txEl>
+                                          </p:spTgt>
+                                        </p:tgtEl>
+                                        <p:attrNameLst>
+                                          <p:attrName>style.visibility</p:attrName>
+                                        </p:attrNameLst>
+                                      </p:cBhvr>
+                                      <p:to>
+                                        <p:strVal val="visible"/>
+                                      </p:to>
+                                    </p:set>
+                                    <p:animEffect transition="in" filter="fade">
+                                      <p:cBhvr>
+                                        <p:cTn id="72" dur="100"/>
+                                        <p:tgtEl>
+                                          <p:spTgt spid="151">
                                             <p:txEl>
                                               <p:pRg st="7" end="7"/>
                                             </p:txEl>
@@ -13840,7 +13965,7 @@
   <p:cSld>
     <p:spTree>
       <p:nvGrpSpPr>
-        <p:cNvPr id="1" name="Shape 152"/>
+        <p:cNvPr id="1" name="Shape 155"/>
         <p:cNvGrpSpPr/>
         <p:nvPr/>
       </p:nvGrpSpPr>
@@ -13854,7 +13979,7 @@
       </p:grpSpPr>
       <p:sp>
         <p:nvSpPr>
-          <p:cNvPr id="153" name="Google Shape;153;p28"/>
+          <p:cNvPr id="156" name="Google Shape;156;p28"/>
           <p:cNvSpPr txBox="1">
             <a:spLocks noGrp="1"/>
           </p:cNvSpPr>
@@ -13908,7 +14033,7 @@
       </p:sp>
       <p:sp>
         <p:nvSpPr>
-          <p:cNvPr id="154" name="Google Shape;154;p28"/>
+          <p:cNvPr id="157" name="Google Shape;157;p28"/>
           <p:cNvSpPr txBox="1">
             <a:spLocks noGrp="1"/>
           </p:cNvSpPr>
@@ -14038,7 +14163,7 @@
       </p:sp>
       <p:sp>
         <p:nvSpPr>
-          <p:cNvPr id="155" name="Google Shape;155;p28"/>
+          <p:cNvPr id="158" name="Google Shape;158;p28"/>
           <p:cNvSpPr txBox="1">
             <a:spLocks noGrp="1"/>
           </p:cNvSpPr>
@@ -14206,7 +14331,7 @@
                                           </p:stCondLst>
                                         </p:cTn>
                                         <p:tgtEl>
-                                          <p:spTgt spid="154">
+                                          <p:spTgt spid="157">
                                             <p:txEl>
                                               <p:pRg st="0" end="0"/>
                                             </p:txEl>
@@ -14224,7 +14349,7 @@
                                       <p:cBhvr>
                                         <p:cTn id="7" dur="100"/>
                                         <p:tgtEl>
-                                          <p:spTgt spid="154">
+                                          <p:spTgt spid="157">
                                             <p:txEl>
                                               <p:pRg st="0" end="0"/>
                                             </p:txEl>
@@ -14267,7 +14392,7 @@
                                           </p:stCondLst>
                                         </p:cTn>
                                         <p:tgtEl>
-                                          <p:spTgt spid="154">
+                                          <p:spTgt spid="157">
                                             <p:txEl>
                                               <p:pRg st="1" end="1"/>
                                             </p:txEl>
@@ -14285,7 +14410,7 @@
                                       <p:cBhvr>
                                         <p:cTn id="12" dur="100"/>
                                         <p:tgtEl>
-                                          <p:spTgt spid="154">
+                                          <p:spTgt spid="157">
                                             <p:txEl>
                                               <p:pRg st="1" end="1"/>
                                             </p:txEl>
@@ -14328,7 +14453,7 @@
                                           </p:stCondLst>
                                         </p:cTn>
                                         <p:tgtEl>
-                                          <p:spTgt spid="154">
+                                          <p:spTgt spid="157">
                                             <p:txEl>
                                               <p:pRg st="2" end="2"/>
                                             </p:txEl>
@@ -14346,7 +14471,7 @@
                                       <p:cBhvr>
                                         <p:cTn id="17" dur="100"/>
                                         <p:tgtEl>
-                                          <p:spTgt spid="154">
+                                          <p:spTgt spid="157">
                                             <p:txEl>
                                               <p:pRg st="2" end="2"/>
                                             </p:txEl>
@@ -14389,7 +14514,7 @@
                                           </p:stCondLst>
                                         </p:cTn>
                                         <p:tgtEl>
-                                          <p:spTgt spid="154">
+                                          <p:spTgt spid="157">
                                             <p:txEl>
                                               <p:pRg st="3" end="3"/>
                                             </p:txEl>
@@ -14407,7 +14532,7 @@
                                       <p:cBhvr>
                                         <p:cTn id="22" dur="100"/>
                                         <p:tgtEl>
-                                          <p:spTgt spid="154">
+                                          <p:spTgt spid="157">
                                             <p:txEl>
                                               <p:pRg st="3" end="3"/>
                                             </p:txEl>
@@ -14450,7 +14575,7 @@
                                           </p:stCondLst>
                                         </p:cTn>
                                         <p:tgtEl>
-                                          <p:spTgt spid="155">
+                                          <p:spTgt spid="158">
                                             <p:txEl>
                                               <p:pRg st="0" end="0"/>
                                             </p:txEl>
@@ -14468,7 +14593,7 @@
                                       <p:cBhvr>
                                         <p:cTn id="27" dur="100"/>
                                         <p:tgtEl>
-                                          <p:spTgt spid="155">
+                                          <p:spTgt spid="158">
                                             <p:txEl>
                                               <p:pRg st="0" end="0"/>
                                             </p:txEl>
@@ -14511,7 +14636,7 @@
                                           </p:stCondLst>
                                         </p:cTn>
                                         <p:tgtEl>
-                                          <p:spTgt spid="155">
+                                          <p:spTgt spid="158">
                                             <p:txEl>
                                               <p:pRg st="1" end="1"/>
                                             </p:txEl>
@@ -14529,7 +14654,7 @@
                                       <p:cBhvr>
                                         <p:cTn id="32" dur="100"/>
                                         <p:tgtEl>
-                                          <p:spTgt spid="155">
+                                          <p:spTgt spid="158">
                                             <p:txEl>
                                               <p:pRg st="1" end="1"/>
                                             </p:txEl>
@@ -14572,7 +14697,7 @@
                                           </p:stCondLst>
                                         </p:cTn>
                                         <p:tgtEl>
-                                          <p:spTgt spid="155">
+                                          <p:spTgt spid="158">
                                             <p:txEl>
                                               <p:pRg st="2" end="2"/>
                                             </p:txEl>
@@ -14590,7 +14715,7 @@
                                       <p:cBhvr>
                                         <p:cTn id="37" dur="100"/>
                                         <p:tgtEl>
-                                          <p:spTgt spid="155">
+                                          <p:spTgt spid="158">
                                             <p:txEl>
                                               <p:pRg st="2" end="2"/>
                                             </p:txEl>
@@ -14633,7 +14758,7 @@
                                           </p:stCondLst>
                                         </p:cTn>
                                         <p:tgtEl>
-                                          <p:spTgt spid="155">
+                                          <p:spTgt spid="158">
                                             <p:txEl>
                                               <p:pRg st="3" end="3"/>
                                             </p:txEl>
@@ -14651,7 +14776,7 @@
                                       <p:cBhvr>
                                         <p:cTn id="42" dur="100"/>
                                         <p:tgtEl>
-                                          <p:spTgt spid="155">
+                                          <p:spTgt spid="158">
                                             <p:txEl>
                                               <p:pRg st="3" end="3"/>
                                             </p:txEl>
@@ -14694,7 +14819,7 @@
                                           </p:stCondLst>
                                         </p:cTn>
                                         <p:tgtEl>
-                                          <p:spTgt spid="155">
+                                          <p:spTgt spid="158">
                                             <p:txEl>
                                               <p:pRg st="4" end="4"/>
                                             </p:txEl>
@@ -14712,7 +14837,7 @@
                                       <p:cBhvr>
                                         <p:cTn id="47" dur="100"/>
                                         <p:tgtEl>
-                                          <p:spTgt spid="155">
+                                          <p:spTgt spid="158">
                                             <p:txEl>
                                               <p:pRg st="4" end="4"/>
                                             </p:txEl>
@@ -14759,7 +14884,7 @@
   <p:cSld>
     <p:spTree>
       <p:nvGrpSpPr>
-        <p:cNvPr id="1" name="Shape 159"/>
+        <p:cNvPr id="1" name="Shape 162"/>
         <p:cNvGrpSpPr/>
         <p:nvPr/>
       </p:nvGrpSpPr>
@@ -14773,7 +14898,7 @@
       </p:grpSpPr>
       <p:sp>
         <p:nvSpPr>
-          <p:cNvPr id="160" name="Google Shape;160;p29"/>
+          <p:cNvPr id="163" name="Google Shape;163;p29"/>
           <p:cNvSpPr txBox="1">
             <a:spLocks noGrp="1"/>
           </p:cNvSpPr>
@@ -14815,7 +14940,7 @@
       </p:sp>
       <p:sp>
         <p:nvSpPr>
-          <p:cNvPr id="161" name="Google Shape;161;p29"/>
+          <p:cNvPr id="164" name="Google Shape;164;p29"/>
           <p:cNvSpPr txBox="1">
             <a:spLocks noGrp="1"/>
           </p:cNvSpPr>
@@ -15019,7 +15144,7 @@
             <a:endParaRPr dirty="0"/>
           </a:p>
           <a:p>
-            <a:pPr lvl="0" algn="l" rtl="0">
+            <a:pPr marL="457200" lvl="0" indent="-342900" algn="l" rtl="0">
               <a:spcBef>
                 <a:spcPts val="0"/>
               </a:spcBef>
@@ -15027,7 +15152,6 @@
                 <a:spcPts val="0"/>
               </a:spcAft>
               <a:buSzPts val="1800"/>
-              <a:buFont typeface="+mj-lt"/>
               <a:buAutoNum type="arabicPeriod"/>
             </a:pPr>
             <a:r>
@@ -15037,7 +15161,7 @@
             <a:endParaRPr dirty="0"/>
           </a:p>
           <a:p>
-            <a:pPr lvl="0" algn="l" rtl="0">
+            <a:pPr marL="457200" lvl="0" indent="-342900" algn="l" rtl="0">
               <a:spcBef>
                 <a:spcPts val="0"/>
               </a:spcBef>
@@ -15045,7 +15169,6 @@
                 <a:spcPts val="0"/>
               </a:spcAft>
               <a:buSzPts val="1800"/>
-              <a:buFont typeface="+mj-lt"/>
               <a:buAutoNum type="arabicPeriod"/>
             </a:pPr>
             <a:r>
@@ -15064,7 +15187,7 @@
               </a:spcAft>
               <a:buSzPts val="1400"/>
               <a:buFont typeface="+mj-lt"/>
-              <a:buAutoNum type="alphaLcParenR"/>
+              <a:buAutoNum type="alphaLcPeriod"/>
             </a:pPr>
             <a:r>
               <a:rPr lang="en" dirty="0"/>
@@ -15082,7 +15205,7 @@
               </a:spcAft>
               <a:buSzPts val="1400"/>
               <a:buFont typeface="+mj-lt"/>
-              <a:buAutoNum type="alphaLcParenR"/>
+              <a:buAutoNum type="alphaLcPeriod"/>
             </a:pPr>
             <a:r>
               <a:rPr lang="en" dirty="0"/>
@@ -15091,21 +15214,20 @@
             <a:endParaRPr dirty="0"/>
           </a:p>
           <a:p>
-            <a:pPr lvl="0" algn="l" rtl="0">
-              <a:spcBef>
-                <a:spcPts val="0"/>
-              </a:spcBef>
-              <a:spcAft>
-                <a:spcPts val="0"/>
-              </a:spcAft>
-              <a:buSzPts val="1800"/>
+            <a:pPr marL="1257300" lvl="0" algn="l" rtl="0">
+              <a:spcBef>
+                <a:spcPts val="0"/>
+              </a:spcBef>
+              <a:spcAft>
+                <a:spcPts val="0"/>
+              </a:spcAft>
               <a:buFont typeface="+mj-lt"/>
               <a:buAutoNum type="arabicPeriod"/>
             </a:pPr>
-            <a:endParaRPr lang="en" dirty="0"/>
+            <a:endParaRPr dirty="0"/>
           </a:p>
           <a:p>
-            <a:pPr lvl="0" algn="l" rtl="0">
+            <a:pPr marL="457200" lvl="0" indent="-342900" algn="l" rtl="0">
               <a:spcBef>
                 <a:spcPts val="0"/>
               </a:spcBef>
@@ -15113,7 +15235,6 @@
                 <a:spcPts val="0"/>
               </a:spcAft>
               <a:buSzPts val="1800"/>
-              <a:buFont typeface="+mj-lt"/>
               <a:buAutoNum type="arabicPeriod"/>
             </a:pPr>
             <a:r>
@@ -19872,7 +19993,7 @@
           </a:bodyPr>
           <a:lstStyle/>
           <a:p>
-            <a:pPr marL="552450" lvl="0" indent="-457200" algn="l" rtl="0">
+            <a:pPr marL="457200" lvl="0" indent="-361950" algn="l" rtl="0">
               <a:spcBef>
                 <a:spcPts val="0"/>
               </a:spcBef>
@@ -19883,7 +20004,6 @@
                 <a:schemeClr val="dk1"/>
               </a:buClr>
               <a:buSzPts val="2100"/>
-              <a:buFont typeface="+mj-lt"/>
               <a:buAutoNum type="arabicPeriod"/>
             </a:pPr>
             <a:r>
@@ -21480,7 +21600,7 @@
         <p:spPr>
           <a:xfrm>
             <a:off x="311700" y="1152475"/>
-            <a:ext cx="4260300" cy="3416400"/>
+            <a:ext cx="4260300" cy="1880100"/>
           </a:xfrm>
           <a:prstGeom prst="rect">
             <a:avLst/>
@@ -21488,7 +21608,7 @@
         </p:spPr>
         <p:txBody>
           <a:bodyPr spcFirstLastPara="1" wrap="square" lIns="91425" tIns="91425" rIns="91425" bIns="91425" anchor="t" anchorCtr="0">
-            <a:normAutofit lnSpcReduction="10000"/>
+            <a:normAutofit/>
           </a:bodyPr>
           <a:lstStyle/>
           <a:p>
@@ -21592,114 +21712,6 @@
                 </a:solidFill>
               </a:rPr>
               <a:t>Defragments free space, faster future allocations</a:t>
-            </a:r>
-            <a:endParaRPr sz="1600">
-              <a:solidFill>
-                <a:schemeClr val="dk1"/>
-              </a:solidFill>
-            </a:endParaRPr>
-          </a:p>
-          <a:p>
-            <a:pPr marL="0" lvl="0" indent="0" algn="l" rtl="0">
-              <a:spcBef>
-                <a:spcPts val="1200"/>
-              </a:spcBef>
-              <a:spcAft>
-                <a:spcPts val="0"/>
-              </a:spcAft>
-              <a:buNone/>
-            </a:pPr>
-            <a:r>
-              <a:rPr lang="en" sz="1600" b="1">
-                <a:solidFill>
-                  <a:schemeClr val="dk1"/>
-                </a:solidFill>
-              </a:rPr>
-              <a:t>Copying Collection (or Mark and Copy)</a:t>
-            </a:r>
-            <a:endParaRPr sz="1600" b="1">
-              <a:solidFill>
-                <a:schemeClr val="dk1"/>
-              </a:solidFill>
-            </a:endParaRPr>
-          </a:p>
-          <a:p>
-            <a:pPr marL="457200" lvl="0" indent="-330200" algn="l" rtl="0">
-              <a:spcBef>
-                <a:spcPts val="0"/>
-              </a:spcBef>
-              <a:spcAft>
-                <a:spcPts val="0"/>
-              </a:spcAft>
-              <a:buClr>
-                <a:schemeClr val="dk1"/>
-              </a:buClr>
-              <a:buSzPts val="1600"/>
-              <a:buChar char="-"/>
-            </a:pPr>
-            <a:r>
-              <a:rPr lang="en" sz="1600">
-                <a:solidFill>
-                  <a:schemeClr val="dk1"/>
-                </a:solidFill>
-              </a:rPr>
-              <a:t>Similar to MSC, but moves from one region to another</a:t>
-            </a:r>
-            <a:endParaRPr sz="1600">
-              <a:solidFill>
-                <a:schemeClr val="dk1"/>
-              </a:solidFill>
-            </a:endParaRPr>
-          </a:p>
-          <a:p>
-            <a:pPr marL="457200" lvl="0" indent="-330200" algn="l" rtl="0">
-              <a:spcBef>
-                <a:spcPts val="0"/>
-              </a:spcBef>
-              <a:spcAft>
-                <a:spcPts val="0"/>
-              </a:spcAft>
-              <a:buClr>
-                <a:schemeClr val="dk1"/>
-              </a:buClr>
-              <a:buSzPts val="1600"/>
-              <a:buChar char="-"/>
-            </a:pPr>
-            <a:r>
-              <a:rPr lang="en" sz="1600">
-                <a:solidFill>
-                  <a:schemeClr val="dk1"/>
-                </a:solidFill>
-              </a:rPr>
-              <a:t>Advantage: In parallel with mark step</a:t>
-            </a:r>
-            <a:endParaRPr sz="1600">
-              <a:solidFill>
-                <a:schemeClr val="dk1"/>
-              </a:solidFill>
-            </a:endParaRPr>
-          </a:p>
-          <a:p>
-            <a:pPr marL="457200" lvl="0" indent="-330200" algn="l" rtl="0">
-              <a:spcBef>
-                <a:spcPts val="0"/>
-              </a:spcBef>
-              <a:spcAft>
-                <a:spcPts val="0"/>
-              </a:spcAft>
-              <a:buClr>
-                <a:schemeClr val="dk1"/>
-              </a:buClr>
-              <a:buSzPts val="1600"/>
-              <a:buChar char="-"/>
-            </a:pPr>
-            <a:r>
-              <a:rPr lang="en" sz="1600">
-                <a:solidFill>
-                  <a:schemeClr val="dk1"/>
-                </a:solidFill>
-              </a:rPr>
-              <a:t>Disadvantage: More reserved memory</a:t>
             </a:r>
             <a:endParaRPr sz="1600">
               <a:solidFill>
@@ -21931,6 +21943,204 @@
           </a:p>
         </p:txBody>
       </p:sp>
+      <p:pic>
+        <p:nvPicPr>
+          <p:cNvPr id="103" name="Google Shape;103;p20"/>
+          <p:cNvPicPr preferRelativeResize="0"/>
+          <p:nvPr/>
+        </p:nvPicPr>
+        <p:blipFill>
+          <a:blip r:embed="rId3">
+            <a:alphaModFix/>
+          </a:blip>
+          <a:stretch>
+            <a:fillRect/>
+          </a:stretch>
+        </p:blipFill>
+        <p:spPr>
+          <a:xfrm>
+            <a:off x="4650912" y="1323925"/>
+            <a:ext cx="4362876" cy="1301400"/>
+          </a:xfrm>
+          <a:prstGeom prst="rect">
+            <a:avLst/>
+          </a:prstGeom>
+          <a:noFill/>
+          <a:ln>
+            <a:noFill/>
+          </a:ln>
+        </p:spPr>
+      </p:pic>
+      <p:pic>
+        <p:nvPicPr>
+          <p:cNvPr id="104" name="Google Shape;104;p20"/>
+          <p:cNvPicPr preferRelativeResize="0"/>
+          <p:nvPr/>
+        </p:nvPicPr>
+        <p:blipFill>
+          <a:blip r:embed="rId4">
+            <a:alphaModFix/>
+          </a:blip>
+          <a:stretch>
+            <a:fillRect/>
+          </a:stretch>
+        </p:blipFill>
+        <p:spPr>
+          <a:xfrm>
+            <a:off x="4650895" y="3228575"/>
+            <a:ext cx="4362901" cy="1044971"/>
+          </a:xfrm>
+          <a:prstGeom prst="rect">
+            <a:avLst/>
+          </a:prstGeom>
+          <a:noFill/>
+          <a:ln>
+            <a:noFill/>
+          </a:ln>
+        </p:spPr>
+      </p:pic>
+      <p:sp>
+        <p:nvSpPr>
+          <p:cNvPr id="105" name="Google Shape;105;p20"/>
+          <p:cNvSpPr txBox="1"/>
+          <p:nvPr/>
+        </p:nvSpPr>
+        <p:spPr>
+          <a:xfrm>
+            <a:off x="311700" y="3032575"/>
+            <a:ext cx="4260300" cy="1563900"/>
+          </a:xfrm>
+          <a:prstGeom prst="rect">
+            <a:avLst/>
+          </a:prstGeom>
+          <a:noFill/>
+          <a:ln>
+            <a:noFill/>
+          </a:ln>
+        </p:spPr>
+        <p:txBody>
+          <a:bodyPr spcFirstLastPara="1" wrap="square" lIns="91425" tIns="91425" rIns="91425" bIns="91425" anchor="t" anchorCtr="0">
+            <a:spAutoFit/>
+          </a:bodyPr>
+          <a:lstStyle/>
+          <a:p>
+            <a:pPr marL="0" lvl="0" indent="0" algn="l" rtl="0">
+              <a:lnSpc>
+                <a:spcPct val="115000"/>
+              </a:lnSpc>
+              <a:spcBef>
+                <a:spcPts val="0"/>
+              </a:spcBef>
+              <a:spcAft>
+                <a:spcPts val="0"/>
+              </a:spcAft>
+              <a:buNone/>
+            </a:pPr>
+            <a:r>
+              <a:rPr lang="en" sz="1600" b="1">
+                <a:solidFill>
+                  <a:schemeClr val="dk1"/>
+                </a:solidFill>
+              </a:rPr>
+              <a:t>Copying Collection (or Mark and Copy)</a:t>
+            </a:r>
+            <a:endParaRPr sz="1600" b="1">
+              <a:solidFill>
+                <a:schemeClr val="dk1"/>
+              </a:solidFill>
+            </a:endParaRPr>
+          </a:p>
+          <a:p>
+            <a:pPr marL="457200" lvl="0" indent="-330200" algn="l" rtl="0">
+              <a:lnSpc>
+                <a:spcPct val="115000"/>
+              </a:lnSpc>
+              <a:spcBef>
+                <a:spcPts val="0"/>
+              </a:spcBef>
+              <a:spcAft>
+                <a:spcPts val="0"/>
+              </a:spcAft>
+              <a:buClr>
+                <a:schemeClr val="dk1"/>
+              </a:buClr>
+              <a:buSzPts val="1600"/>
+              <a:buChar char="-"/>
+            </a:pPr>
+            <a:r>
+              <a:rPr lang="en" sz="1600">
+                <a:solidFill>
+                  <a:schemeClr val="dk1"/>
+                </a:solidFill>
+              </a:rPr>
+              <a:t>Similar to MSC, but moves from one region to another</a:t>
+            </a:r>
+            <a:endParaRPr sz="1600">
+              <a:solidFill>
+                <a:schemeClr val="dk1"/>
+              </a:solidFill>
+            </a:endParaRPr>
+          </a:p>
+          <a:p>
+            <a:pPr marL="457200" lvl="0" indent="-330200" algn="l" rtl="0">
+              <a:lnSpc>
+                <a:spcPct val="115000"/>
+              </a:lnSpc>
+              <a:spcBef>
+                <a:spcPts val="0"/>
+              </a:spcBef>
+              <a:spcAft>
+                <a:spcPts val="0"/>
+              </a:spcAft>
+              <a:buClr>
+                <a:schemeClr val="dk1"/>
+              </a:buClr>
+              <a:buSzPts val="1600"/>
+              <a:buChar char="-"/>
+            </a:pPr>
+            <a:r>
+              <a:rPr lang="en" sz="1600">
+                <a:solidFill>
+                  <a:schemeClr val="dk1"/>
+                </a:solidFill>
+              </a:rPr>
+              <a:t>Advantage: In parallel with mark step</a:t>
+            </a:r>
+            <a:endParaRPr sz="1600">
+              <a:solidFill>
+                <a:schemeClr val="dk1"/>
+              </a:solidFill>
+            </a:endParaRPr>
+          </a:p>
+          <a:p>
+            <a:pPr marL="457200" lvl="0" indent="-330200" algn="l" rtl="0">
+              <a:lnSpc>
+                <a:spcPct val="115000"/>
+              </a:lnSpc>
+              <a:spcBef>
+                <a:spcPts val="0"/>
+              </a:spcBef>
+              <a:spcAft>
+                <a:spcPts val="0"/>
+              </a:spcAft>
+              <a:buClr>
+                <a:schemeClr val="dk1"/>
+              </a:buClr>
+              <a:buSzPts val="1600"/>
+              <a:buChar char="-"/>
+            </a:pPr>
+            <a:r>
+              <a:rPr lang="en" sz="1600">
+                <a:solidFill>
+                  <a:schemeClr val="dk1"/>
+                </a:solidFill>
+              </a:rPr>
+              <a:t>Disadvantage: More reserved memory</a:t>
+            </a:r>
+            <a:endParaRPr/>
+          </a:p>
+        </p:txBody>
+      </p:sp>
     </p:spTree>
   </p:cSld>
   <p:clrMapOvr>
@@ -22214,11 +22424,7 @@
                                           </p:stCondLst>
                                         </p:cTn>
                                         <p:tgtEl>
-                                          <p:spTgt spid="101">
-                                            <p:txEl>
-                                              <p:pRg st="4" end="4"/>
-                                            </p:txEl>
-                                          </p:spTgt>
+                                          <p:spTgt spid="103"/>
                                         </p:tgtEl>
                                         <p:attrNameLst>
                                           <p:attrName>style.visibility</p:attrName>
@@ -22232,11 +22438,7 @@
                                       <p:cBhvr>
                                         <p:cTn id="27" dur="100"/>
                                         <p:tgtEl>
-                                          <p:spTgt spid="101">
-                                            <p:txEl>
-                                              <p:pRg st="4" end="4"/>
-                                            </p:txEl>
-                                          </p:spTgt>
+                                          <p:spTgt spid="103"/>
                                         </p:tgtEl>
                                       </p:cBhvr>
                                     </p:animEffect>
@@ -22275,9 +22477,9 @@
                                           </p:stCondLst>
                                         </p:cTn>
                                         <p:tgtEl>
-                                          <p:spTgt spid="101">
-                                            <p:txEl>
-                                              <p:pRg st="5" end="5"/>
+                                          <p:spTgt spid="105">
+                                            <p:txEl>
+                                              <p:pRg st="0" end="0"/>
                                             </p:txEl>
                                           </p:spTgt>
                                         </p:tgtEl>
@@ -22293,9 +22495,9 @@
                                       <p:cBhvr>
                                         <p:cTn id="32" dur="100"/>
                                         <p:tgtEl>
-                                          <p:spTgt spid="101">
-                                            <p:txEl>
-                                              <p:pRg st="5" end="5"/>
+                                          <p:spTgt spid="105">
+                                            <p:txEl>
+                                              <p:pRg st="0" end="0"/>
                                             </p:txEl>
                                           </p:spTgt>
                                         </p:tgtEl>
@@ -22336,9 +22538,9 @@
                                           </p:stCondLst>
                                         </p:cTn>
                                         <p:tgtEl>
-                                          <p:spTgt spid="101">
-                                            <p:txEl>
-                                              <p:pRg st="6" end="6"/>
+                                          <p:spTgt spid="105">
+                                            <p:txEl>
+                                              <p:pRg st="1" end="1"/>
                                             </p:txEl>
                                           </p:spTgt>
                                         </p:tgtEl>
@@ -22354,9 +22556,9 @@
                                       <p:cBhvr>
                                         <p:cTn id="37" dur="100"/>
                                         <p:tgtEl>
-                                          <p:spTgt spid="101">
-                                            <p:txEl>
-                                              <p:pRg st="6" end="6"/>
+                                          <p:spTgt spid="105">
+                                            <p:txEl>
+                                              <p:pRg st="1" end="1"/>
                                             </p:txEl>
                                           </p:spTgt>
                                         </p:tgtEl>
@@ -22397,9 +22599,9 @@
                                           </p:stCondLst>
                                         </p:cTn>
                                         <p:tgtEl>
-                                          <p:spTgt spid="101">
-                                            <p:txEl>
-                                              <p:pRg st="7" end="7"/>
+                                          <p:spTgt spid="105">
+                                            <p:txEl>
+                                              <p:pRg st="2" end="2"/>
                                             </p:txEl>
                                           </p:spTgt>
                                         </p:tgtEl>
@@ -22415,9 +22617,9 @@
                                       <p:cBhvr>
                                         <p:cTn id="42" dur="100"/>
                                         <p:tgtEl>
-                                          <p:spTgt spid="101">
-                                            <p:txEl>
-                                              <p:pRg st="7" end="7"/>
+                                          <p:spTgt spid="105">
+                                            <p:txEl>
+                                              <p:pRg st="2" end="2"/>
                                             </p:txEl>
                                           </p:spTgt>
                                         </p:tgtEl>
@@ -22458,9 +22660,9 @@
                                           </p:stCondLst>
                                         </p:cTn>
                                         <p:tgtEl>
-                                          <p:spTgt spid="102">
-                                            <p:txEl>
-                                              <p:pRg st="0" end="0"/>
+                                          <p:spTgt spid="105">
+                                            <p:txEl>
+                                              <p:pRg st="3" end="3"/>
                                             </p:txEl>
                                           </p:spTgt>
                                         </p:tgtEl>
@@ -22476,9 +22678,9 @@
                                       <p:cBhvr>
                                         <p:cTn id="47" dur="100"/>
                                         <p:tgtEl>
-                                          <p:spTgt spid="102">
-                                            <p:txEl>
-                                              <p:pRg st="0" end="0"/>
+                                          <p:spTgt spid="105">
+                                            <p:txEl>
+                                              <p:pRg st="3" end="3"/>
                                             </p:txEl>
                                           </p:spTgt>
                                         </p:tgtEl>
@@ -22519,11 +22721,7 @@
                                           </p:stCondLst>
                                         </p:cTn>
                                         <p:tgtEl>
-                                          <p:spTgt spid="102">
-                                            <p:txEl>
-                                              <p:pRg st="1" end="1"/>
-                                            </p:txEl>
-                                          </p:spTgt>
+                                          <p:spTgt spid="104"/>
                                         </p:tgtEl>
                                         <p:attrNameLst>
                                           <p:attrName>style.visibility</p:attrName>
@@ -22537,11 +22735,7 @@
                                       <p:cBhvr>
                                         <p:cTn id="52" dur="100"/>
                                         <p:tgtEl>
-                                          <p:spTgt spid="102">
-                                            <p:txEl>
-                                              <p:pRg st="1" end="1"/>
-                                            </p:txEl>
-                                          </p:spTgt>
+                                          <p:spTgt spid="104"/>
                                         </p:tgtEl>
                                       </p:cBhvr>
                                     </p:animEffect>
@@ -22567,14 +22761,102 @@
                             </p:stCondLst>
                             <p:childTnLst>
                               <p:par>
-                                <p:cTn id="55" presetID="10" presetClass="entr" presetSubtype="0" fill="hold" nodeType="clickEffect">
+                                <p:cTn id="55" presetID="10" presetClass="exit" presetSubtype="0" fill="hold" nodeType="clickEffect">
+                                  <p:stCondLst>
+                                    <p:cond delay="0"/>
+                                  </p:stCondLst>
+                                  <p:childTnLst>
+                                    <p:animEffect transition="out" filter="fade">
+                                      <p:cBhvr>
+                                        <p:cTn id="56" dur="100"/>
+                                        <p:tgtEl>
+                                          <p:spTgt spid="103"/>
+                                        </p:tgtEl>
+                                      </p:cBhvr>
+                                    </p:animEffect>
+                                    <p:set>
+                                      <p:cBhvr>
+                                        <p:cTn id="57" dur="1" fill="hold">
+                                          <p:stCondLst>
+                                            <p:cond delay="100"/>
+                                          </p:stCondLst>
+                                        </p:cTn>
+                                        <p:tgtEl>
+                                          <p:spTgt spid="103"/>
+                                        </p:tgtEl>
+                                        <p:attrNameLst>
+                                          <p:attrName>style.visibility</p:attrName>
+                                        </p:attrNameLst>
+                                      </p:cBhvr>
+                                      <p:to>
+                                        <p:strVal val="hidden"/>
+                                      </p:to>
+                                    </p:set>
+                                  </p:childTnLst>
+                                </p:cTn>
+                              </p:par>
+                              <p:par>
+                                <p:cTn id="58" presetID="10" presetClass="exit" presetSubtype="0" fill="hold" nodeType="withEffect">
+                                  <p:stCondLst>
+                                    <p:cond delay="0"/>
+                                  </p:stCondLst>
+                                  <p:childTnLst>
+                                    <p:animEffect transition="out" filter="fade">
+                                      <p:cBhvr>
+                                        <p:cTn id="59" dur="100"/>
+                                        <p:tgtEl>
+                                          <p:spTgt spid="104"/>
+                                        </p:tgtEl>
+                                      </p:cBhvr>
+                                    </p:animEffect>
+                                    <p:set>
+                                      <p:cBhvr>
+                                        <p:cTn id="60" dur="1" fill="hold">
+                                          <p:stCondLst>
+                                            <p:cond delay="100"/>
+                                          </p:stCondLst>
+                                        </p:cTn>
+                                        <p:tgtEl>
+                                          <p:spTgt spid="104"/>
+                                        </p:tgtEl>
+                                        <p:attrNameLst>
+                                          <p:attrName>style.visibility</p:attrName>
+                                        </p:attrNameLst>
+                                      </p:cBhvr>
+                                      <p:to>
+                                        <p:strVal val="hidden"/>
+                                      </p:to>
+                                    </p:set>
+                                  </p:childTnLst>
+                                </p:cTn>
+                              </p:par>
+                            </p:childTnLst>
+                          </p:cTn>
+                        </p:par>
+                      </p:childTnLst>
+                    </p:cTn>
+                  </p:par>
+                  <p:par>
+                    <p:cTn id="61" fill="hold">
+                      <p:stCondLst>
+                        <p:cond delay="indefinite"/>
+                      </p:stCondLst>
+                      <p:childTnLst>
+                        <p:par>
+                          <p:cTn id="62" fill="hold">
+                            <p:stCondLst>
+                              <p:cond delay="0"/>
+                            </p:stCondLst>
+                            <p:childTnLst>
+                              <p:par>
+                                <p:cTn id="63" presetID="10" presetClass="entr" presetSubtype="0" fill="hold" nodeType="clickEffect">
                                   <p:stCondLst>
                                     <p:cond delay="0"/>
                                   </p:stCondLst>
                                   <p:childTnLst>
                                     <p:set>
                                       <p:cBhvr>
-                                        <p:cTn id="56" dur="1" fill="hold">
+                                        <p:cTn id="64" dur="1" fill="hold">
                                           <p:stCondLst>
                                             <p:cond delay="0"/>
                                           </p:stCondLst>
@@ -22582,7 +22864,7 @@
                                         <p:tgtEl>
                                           <p:spTgt spid="102">
                                             <p:txEl>
-                                              <p:pRg st="2" end="2"/>
+                                              <p:pRg st="0" end="0"/>
                                             </p:txEl>
                                           </p:spTgt>
                                         </p:tgtEl>
@@ -22596,11 +22878,11 @@
                                     </p:set>
                                     <p:animEffect transition="in" filter="fade">
                                       <p:cBhvr>
-                                        <p:cTn id="57" dur="100"/>
+                                        <p:cTn id="65" dur="100"/>
                                         <p:tgtEl>
                                           <p:spTgt spid="102">
                                             <p:txEl>
-                                              <p:pRg st="2" end="2"/>
+                                              <p:pRg st="0" end="0"/>
                                             </p:txEl>
                                           </p:spTgt>
                                         </p:tgtEl>
@@ -22616,26 +22898,26 @@
                     </p:cTn>
                   </p:par>
                   <p:par>
-                    <p:cTn id="58" fill="hold">
+                    <p:cTn id="66" fill="hold">
                       <p:stCondLst>
                         <p:cond delay="indefinite"/>
                       </p:stCondLst>
                       <p:childTnLst>
                         <p:par>
-                          <p:cTn id="59" fill="hold">
+                          <p:cTn id="67" fill="hold">
                             <p:stCondLst>
                               <p:cond delay="0"/>
                             </p:stCondLst>
                             <p:childTnLst>
                               <p:par>
-                                <p:cTn id="60" presetID="10" presetClass="entr" presetSubtype="0" fill="hold" nodeType="clickEffect">
+                                <p:cTn id="68" presetID="10" presetClass="entr" presetSubtype="0" fill="hold" nodeType="clickEffect">
                                   <p:stCondLst>
                                     <p:cond delay="0"/>
                                   </p:stCondLst>
                                   <p:childTnLst>
                                     <p:set>
                                       <p:cBhvr>
-                                        <p:cTn id="61" dur="1" fill="hold">
+                                        <p:cTn id="69" dur="1" fill="hold">
                                           <p:stCondLst>
                                             <p:cond delay="0"/>
                                           </p:stCondLst>
@@ -22643,7 +22925,7 @@
                                         <p:tgtEl>
                                           <p:spTgt spid="102">
                                             <p:txEl>
-                                              <p:pRg st="3" end="3"/>
+                                              <p:pRg st="1" end="1"/>
                                             </p:txEl>
                                           </p:spTgt>
                                         </p:tgtEl>
@@ -22657,11 +22939,11 @@
                                     </p:set>
                                     <p:animEffect transition="in" filter="fade">
                                       <p:cBhvr>
-                                        <p:cTn id="62" dur="100"/>
+                                        <p:cTn id="70" dur="100"/>
                                         <p:tgtEl>
                                           <p:spTgt spid="102">
                                             <p:txEl>
-                                              <p:pRg st="3" end="3"/>
+                                              <p:pRg st="1" end="1"/>
                                             </p:txEl>
                                           </p:spTgt>
                                         </p:tgtEl>
@@ -22677,26 +22959,26 @@
                     </p:cTn>
                   </p:par>
                   <p:par>
-                    <p:cTn id="63" fill="hold">
+                    <p:cTn id="71" fill="hold">
                       <p:stCondLst>
                         <p:cond delay="indefinite"/>
                       </p:stCondLst>
                       <p:childTnLst>
                         <p:par>
-                          <p:cTn id="64" fill="hold">
+                          <p:cTn id="72" fill="hold">
                             <p:stCondLst>
                               <p:cond delay="0"/>
                             </p:stCondLst>
                             <p:childTnLst>
                               <p:par>
-                                <p:cTn id="65" presetID="10" presetClass="entr" presetSubtype="0" fill="hold" nodeType="clickEffect">
+                                <p:cTn id="73" presetID="10" presetClass="entr" presetSubtype="0" fill="hold" nodeType="clickEffect">
                                   <p:stCondLst>
                                     <p:cond delay="0"/>
                                   </p:stCondLst>
                                   <p:childTnLst>
                                     <p:set>
                                       <p:cBhvr>
-                                        <p:cTn id="66" dur="1" fill="hold">
+                                        <p:cTn id="74" dur="1" fill="hold">
                                           <p:stCondLst>
                                             <p:cond delay="0"/>
                                           </p:stCondLst>
@@ -22704,7 +22986,7 @@
                                         <p:tgtEl>
                                           <p:spTgt spid="102">
                                             <p:txEl>
-                                              <p:pRg st="4" end="4"/>
+                                              <p:pRg st="2" end="2"/>
                                             </p:txEl>
                                           </p:spTgt>
                                         </p:tgtEl>
@@ -22718,11 +23000,11 @@
                                     </p:set>
                                     <p:animEffect transition="in" filter="fade">
                                       <p:cBhvr>
-                                        <p:cTn id="67" dur="100"/>
+                                        <p:cTn id="75" dur="100"/>
                                         <p:tgtEl>
                                           <p:spTgt spid="102">
                                             <p:txEl>
-                                              <p:pRg st="4" end="4"/>
+                                              <p:pRg st="2" end="2"/>
                                             </p:txEl>
                                           </p:spTgt>
                                         </p:tgtEl>
@@ -22738,26 +23020,26 @@
                     </p:cTn>
                   </p:par>
                   <p:par>
-                    <p:cTn id="68" fill="hold">
+                    <p:cTn id="76" fill="hold">
                       <p:stCondLst>
                         <p:cond delay="indefinite"/>
                       </p:stCondLst>
                       <p:childTnLst>
                         <p:par>
-                          <p:cTn id="69" fill="hold">
+                          <p:cTn id="77" fill="hold">
                             <p:stCondLst>
                               <p:cond delay="0"/>
                             </p:stCondLst>
                             <p:childTnLst>
                               <p:par>
-                                <p:cTn id="70" presetID="10" presetClass="entr" presetSubtype="0" fill="hold" nodeType="clickEffect">
+                                <p:cTn id="78" presetID="10" presetClass="entr" presetSubtype="0" fill="hold" nodeType="clickEffect">
                                   <p:stCondLst>
                                     <p:cond delay="0"/>
                                   </p:stCondLst>
                                   <p:childTnLst>
                                     <p:set>
                                       <p:cBhvr>
-                                        <p:cTn id="71" dur="1" fill="hold">
+                                        <p:cTn id="79" dur="1" fill="hold">
                                           <p:stCondLst>
                                             <p:cond delay="0"/>
                                           </p:stCondLst>
@@ -22765,7 +23047,7 @@
                                         <p:tgtEl>
                                           <p:spTgt spid="102">
                                             <p:txEl>
-                                              <p:pRg st="5" end="5"/>
+                                              <p:pRg st="3" end="3"/>
                                             </p:txEl>
                                           </p:spTgt>
                                         </p:tgtEl>
@@ -22779,11 +23061,11 @@
                                     </p:set>
                                     <p:animEffect transition="in" filter="fade">
                                       <p:cBhvr>
-                                        <p:cTn id="72" dur="100"/>
+                                        <p:cTn id="80" dur="100"/>
                                         <p:tgtEl>
                                           <p:spTgt spid="102">
                                             <p:txEl>
-                                              <p:pRg st="5" end="5"/>
+                                              <p:pRg st="3" end="3"/>
                                             </p:txEl>
                                           </p:spTgt>
                                         </p:tgtEl>
@@ -22799,26 +23081,26 @@
                     </p:cTn>
                   </p:par>
                   <p:par>
-                    <p:cTn id="73" fill="hold">
+                    <p:cTn id="81" fill="hold">
                       <p:stCondLst>
                         <p:cond delay="indefinite"/>
                       </p:stCondLst>
                       <p:childTnLst>
                         <p:par>
-                          <p:cTn id="74" fill="hold">
+                          <p:cTn id="82" fill="hold">
                             <p:stCondLst>
                               <p:cond delay="0"/>
                             </p:stCondLst>
                             <p:childTnLst>
                               <p:par>
-                                <p:cTn id="75" presetID="10" presetClass="entr" presetSubtype="0" fill="hold" nodeType="clickEffect">
+                                <p:cTn id="83" presetID="10" presetClass="entr" presetSubtype="0" fill="hold" nodeType="clickEffect">
                                   <p:stCondLst>
                                     <p:cond delay="0"/>
                                   </p:stCondLst>
                                   <p:childTnLst>
                                     <p:set>
                                       <p:cBhvr>
-                                        <p:cTn id="76" dur="1" fill="hold">
+                                        <p:cTn id="84" dur="1" fill="hold">
                                           <p:stCondLst>
                                             <p:cond delay="0"/>
                                           </p:stCondLst>
@@ -22826,7 +23108,7 @@
                                         <p:tgtEl>
                                           <p:spTgt spid="102">
                                             <p:txEl>
-                                              <p:pRg st="6" end="6"/>
+                                              <p:pRg st="4" end="4"/>
                                             </p:txEl>
                                           </p:spTgt>
                                         </p:tgtEl>
@@ -22840,11 +23122,11 @@
                                     </p:set>
                                     <p:animEffect transition="in" filter="fade">
                                       <p:cBhvr>
-                                        <p:cTn id="77" dur="100"/>
+                                        <p:cTn id="85" dur="100"/>
                                         <p:tgtEl>
                                           <p:spTgt spid="102">
                                             <p:txEl>
-                                              <p:pRg st="6" end="6"/>
+                                              <p:pRg st="4" end="4"/>
                                             </p:txEl>
                                           </p:spTgt>
                                         </p:tgtEl>
@@ -22860,26 +23142,26 @@
                     </p:cTn>
                   </p:par>
                   <p:par>
-                    <p:cTn id="78" fill="hold">
+                    <p:cTn id="86" fill="hold">
                       <p:stCondLst>
                         <p:cond delay="indefinite"/>
                       </p:stCondLst>
                       <p:childTnLst>
                         <p:par>
-                          <p:cTn id="79" fill="hold">
+                          <p:cTn id="87" fill="hold">
                             <p:stCondLst>
                               <p:cond delay="0"/>
                             </p:stCondLst>
                             <p:childTnLst>
                               <p:par>
-                                <p:cTn id="80" presetID="10" presetClass="entr" presetSubtype="0" fill="hold" nodeType="clickEffect">
+                                <p:cTn id="88" presetID="10" presetClass="entr" presetSubtype="0" fill="hold" nodeType="clickEffect">
                                   <p:stCondLst>
                                     <p:cond delay="0"/>
                                   </p:stCondLst>
                                   <p:childTnLst>
                                     <p:set>
                                       <p:cBhvr>
-                                        <p:cTn id="81" dur="1" fill="hold">
+                                        <p:cTn id="89" dur="1" fill="hold">
                                           <p:stCondLst>
                                             <p:cond delay="0"/>
                                           </p:stCondLst>
@@ -22887,7 +23169,7 @@
                                         <p:tgtEl>
                                           <p:spTgt spid="102">
                                             <p:txEl>
-                                              <p:pRg st="7" end="7"/>
+                                              <p:pRg st="5" end="5"/>
                                             </p:txEl>
                                           </p:spTgt>
                                         </p:tgtEl>
@@ -22901,7 +23183,129 @@
                                     </p:set>
                                     <p:animEffect transition="in" filter="fade">
                                       <p:cBhvr>
-                                        <p:cTn id="82" dur="100"/>
+                                        <p:cTn id="90" dur="100"/>
+                                        <p:tgtEl>
+                                          <p:spTgt spid="102">
+                                            <p:txEl>
+                                              <p:pRg st="5" end="5"/>
+                                            </p:txEl>
+                                          </p:spTgt>
+                                        </p:tgtEl>
+                                      </p:cBhvr>
+                                    </p:animEffect>
+                                  </p:childTnLst>
+                                </p:cTn>
+                              </p:par>
+                            </p:childTnLst>
+                          </p:cTn>
+                        </p:par>
+                      </p:childTnLst>
+                    </p:cTn>
+                  </p:par>
+                  <p:par>
+                    <p:cTn id="91" fill="hold">
+                      <p:stCondLst>
+                        <p:cond delay="indefinite"/>
+                      </p:stCondLst>
+                      <p:childTnLst>
+                        <p:par>
+                          <p:cTn id="92" fill="hold">
+                            <p:stCondLst>
+                              <p:cond delay="0"/>
+                            </p:stCondLst>
+                            <p:childTnLst>
+                              <p:par>
+                                <p:cTn id="93" presetID="10" presetClass="entr" presetSubtype="0" fill="hold" nodeType="clickEffect">
+                                  <p:stCondLst>
+                                    <p:cond delay="0"/>
+                                  </p:stCondLst>
+                                  <p:childTnLst>
+                                    <p:set>
+                                      <p:cBhvr>
+                                        <p:cTn id="94" dur="1" fill="hold">
+                                          <p:stCondLst>
+                                            <p:cond delay="0"/>
+                                          </p:stCondLst>
+                                        </p:cTn>
+                                        <p:tgtEl>
+                                          <p:spTgt spid="102">
+                                            <p:txEl>
+                                              <p:pRg st="6" end="6"/>
+                                            </p:txEl>
+                                          </p:spTgt>
+                                        </p:tgtEl>
+                                        <p:attrNameLst>
+                                          <p:attrName>style.visibility</p:attrName>
+                                        </p:attrNameLst>
+                                      </p:cBhvr>
+                                      <p:to>
+                                        <p:strVal val="visible"/>
+                                      </p:to>
+                                    </p:set>
+                                    <p:animEffect transition="in" filter="fade">
+                                      <p:cBhvr>
+                                        <p:cTn id="95" dur="100"/>
+                                        <p:tgtEl>
+                                          <p:spTgt spid="102">
+                                            <p:txEl>
+                                              <p:pRg st="6" end="6"/>
+                                            </p:txEl>
+                                          </p:spTgt>
+                                        </p:tgtEl>
+                                      </p:cBhvr>
+                                    </p:animEffect>
+                                  </p:childTnLst>
+                                </p:cTn>
+                              </p:par>
+                            </p:childTnLst>
+                          </p:cTn>
+                        </p:par>
+                      </p:childTnLst>
+                    </p:cTn>
+                  </p:par>
+                  <p:par>
+                    <p:cTn id="96" fill="hold">
+                      <p:stCondLst>
+                        <p:cond delay="indefinite"/>
+                      </p:stCondLst>
+                      <p:childTnLst>
+                        <p:par>
+                          <p:cTn id="97" fill="hold">
+                            <p:stCondLst>
+                              <p:cond delay="0"/>
+                            </p:stCondLst>
+                            <p:childTnLst>
+                              <p:par>
+                                <p:cTn id="98" presetID="10" presetClass="entr" presetSubtype="0" fill="hold" nodeType="clickEffect">
+                                  <p:stCondLst>
+                                    <p:cond delay="0"/>
+                                  </p:stCondLst>
+                                  <p:childTnLst>
+                                    <p:set>
+                                      <p:cBhvr>
+                                        <p:cTn id="99" dur="1" fill="hold">
+                                          <p:stCondLst>
+                                            <p:cond delay="0"/>
+                                          </p:stCondLst>
+                                        </p:cTn>
+                                        <p:tgtEl>
+                                          <p:spTgt spid="102">
+                                            <p:txEl>
+                                              <p:pRg st="7" end="7"/>
+                                            </p:txEl>
+                                          </p:spTgt>
+                                        </p:tgtEl>
+                                        <p:attrNameLst>
+                                          <p:attrName>style.visibility</p:attrName>
+                                        </p:attrNameLst>
+                                      </p:cBhvr>
+                                      <p:to>
+                                        <p:strVal val="visible"/>
+                                      </p:to>
+                                    </p:set>
+                                    <p:animEffect transition="in" filter="fade">
+                                      <p:cBhvr>
+                                        <p:cTn id="100" dur="100"/>
                                         <p:tgtEl>
                                           <p:spTgt spid="102">
                                             <p:txEl>
@@ -22950,7 +23354,7 @@
   <p:cSld>
     <p:spTree>
       <p:nvGrpSpPr>
-        <p:cNvPr id="1" name="Shape 106"/>
+        <p:cNvPr id="1" name="Shape 109"/>
         <p:cNvGrpSpPr/>
         <p:nvPr/>
       </p:nvGrpSpPr>
@@ -22964,7 +23368,7 @@
       </p:grpSpPr>
       <p:sp>
         <p:nvSpPr>
-          <p:cNvPr id="107" name="Google Shape;107;p21"/>
+          <p:cNvPr id="110" name="Google Shape;110;p21"/>
           <p:cNvSpPr txBox="1">
             <a:spLocks noGrp="1"/>
           </p:cNvSpPr>
@@ -23006,7 +23410,7 @@
       </p:sp>
       <p:sp>
         <p:nvSpPr>
-          <p:cNvPr id="108" name="Google Shape;108;p21"/>
+          <p:cNvPr id="111" name="Google Shape;111;p21"/>
           <p:cNvSpPr txBox="1">
             <a:spLocks noGrp="1"/>
           </p:cNvSpPr>
@@ -23185,7 +23589,7 @@
       </p:sp>
       <p:sp>
         <p:nvSpPr>
-          <p:cNvPr id="109" name="Google Shape;109;p21"/>
+          <p:cNvPr id="112" name="Google Shape;112;p21"/>
           <p:cNvSpPr txBox="1">
             <a:spLocks noGrp="1"/>
           </p:cNvSpPr>
@@ -23360,7 +23764,7 @@
                                           </p:stCondLst>
                                         </p:cTn>
                                         <p:tgtEl>
-                                          <p:spTgt spid="108">
+                                          <p:spTgt spid="111">
                                             <p:txEl>
                                               <p:pRg st="0" end="0"/>
                                             </p:txEl>
@@ -23378,7 +23782,7 @@
                                       <p:cBhvr>
                                         <p:cTn id="7" dur="100"/>
                                         <p:tgtEl>
-                                          <p:spTgt spid="108">
+                                          <p:spTgt spid="111">
                                             <p:txEl>
                                               <p:pRg st="0" end="0"/>
                                             </p:txEl>
@@ -23421,7 +23825,7 @@
                                           </p:stCondLst>
                                         </p:cTn>
                                         <p:tgtEl>
-                                          <p:spTgt spid="108">
+                                          <p:spTgt spid="111">
                                             <p:txEl>
                                               <p:pRg st="1" end="1"/>
                                             </p:txEl>
@@ -23439,7 +23843,7 @@
                                       <p:cBhvr>
                                         <p:cTn id="12" dur="100"/>
                                         <p:tgtEl>
-                                          <p:spTgt spid="108">
+                                          <p:spTgt spid="111">
                                             <p:txEl>
                                               <p:pRg st="1" end="1"/>
                                             </p:txEl>
@@ -23482,7 +23886,7 @@
                                           </p:stCondLst>
                                         </p:cTn>
                                         <p:tgtEl>
-                                          <p:spTgt spid="108">
+                                          <p:spTgt spid="111">
                                             <p:txEl>
                                               <p:pRg st="2" end="2"/>
                                             </p:txEl>
@@ -23500,7 +23904,7 @@
                                       <p:cBhvr>
                                         <p:cTn id="17" dur="100"/>
                                         <p:tgtEl>
-                                          <p:spTgt spid="108">
+                                          <p:spTgt spid="111">
                                             <p:txEl>
                                               <p:pRg st="2" end="2"/>
                                             </p:txEl>
@@ -23543,7 +23947,7 @@
                                           </p:stCondLst>
                                         </p:cTn>
                                         <p:tgtEl>
-                                          <p:spTgt spid="108">
+                                          <p:spTgt spid="111">
                                             <p:txEl>
                                               <p:pRg st="3" end="3"/>
                                             </p:txEl>
@@ -23561,7 +23965,7 @@
                                       <p:cBhvr>
                                         <p:cTn id="22" dur="100"/>
                                         <p:tgtEl>
-                                          <p:spTgt spid="108">
+                                          <p:spTgt spid="111">
                                             <p:txEl>
                                               <p:pRg st="3" end="3"/>
                                             </p:txEl>
@@ -23604,7 +24008,7 @@
                                           </p:stCondLst>
                                         </p:cTn>
                                         <p:tgtEl>
-                                          <p:spTgt spid="108">
+                                          <p:spTgt spid="111">
                                             <p:txEl>
                                               <p:pRg st="4" end="4"/>
                                             </p:txEl>
@@ -23622,7 +24026,7 @@
                                       <p:cBhvr>
                                         <p:cTn id="27" dur="100"/>
                                         <p:tgtEl>
-                                          <p:spTgt spid="108">
+                                          <p:spTgt spid="111">
                                             <p:txEl>
                                               <p:pRg st="4" end="4"/>
                                             </p:txEl>
@@ -23665,7 +24069,7 @@
                                           </p:stCondLst>
                                         </p:cTn>
                                         <p:tgtEl>
-                                          <p:spTgt spid="108">
+                                          <p:spTgt spid="111">
                                             <p:txEl>
                                               <p:pRg st="5" end="5"/>
                                             </p:txEl>
@@ -23683,7 +24087,7 @@
                                       <p:cBhvr>
                                         <p:cTn id="32" dur="100"/>
                                         <p:tgtEl>
-                                          <p:spTgt spid="108">
+                                          <p:spTgt spid="111">
                                             <p:txEl>
                                               <p:pRg st="5" end="5"/>
                                             </p:txEl>
@@ -23726,7 +24130,7 @@
                                           </p:stCondLst>
                                         </p:cTn>
                                         <p:tgtEl>
-                                          <p:spTgt spid="109">
+                                          <p:spTgt spid="112">
                                             <p:txEl>
                                               <p:pRg st="0" end="0"/>
                                             </p:txEl>
@@ -23744,7 +24148,7 @@
                                       <p:cBhvr>
                                         <p:cTn id="37" dur="100"/>
                                         <p:tgtEl>
-                                          <p:spTgt spid="109">
+                                          <p:spTgt spid="112">
                                             <p:txEl>
                                               <p:pRg st="0" end="0"/>
                                             </p:txEl>
@@ -23787,7 +24191,7 @@
                                           </p:stCondLst>
                                         </p:cTn>
                                         <p:tgtEl>
-                                          <p:spTgt spid="109">
+                                          <p:spTgt spid="112">
                                             <p:txEl>
                                               <p:pRg st="1" end="1"/>
                                             </p:txEl>
@@ -23805,7 +24209,7 @@
                                       <p:cBhvr>
                                         <p:cTn id="42" dur="100"/>
                                         <p:tgtEl>
-                                          <p:spTgt spid="109">
+                                          <p:spTgt spid="112">
                                             <p:txEl>
                                               <p:pRg st="1" end="1"/>
                                             </p:txEl>
@@ -23848,7 +24252,7 @@
                                           </p:stCondLst>
                                         </p:cTn>
                                         <p:tgtEl>
-                                          <p:spTgt spid="109">
+                                          <p:spTgt spid="112">
                                             <p:txEl>
                                               <p:pRg st="2" end="2"/>
                                             </p:txEl>
@@ -23866,7 +24270,7 @@
                                       <p:cBhvr>
                                         <p:cTn id="47" dur="100"/>
                                         <p:tgtEl>
-                                          <p:spTgt spid="109">
+                                          <p:spTgt spid="112">
                                             <p:txEl>
                                               <p:pRg st="2" end="2"/>
                                             </p:txEl>
@@ -23909,7 +24313,7 @@
                                           </p:stCondLst>
                                         </p:cTn>
                                         <p:tgtEl>
-                                          <p:spTgt spid="109">
+                                          <p:spTgt spid="112">
                                             <p:txEl>
                                               <p:pRg st="3" end="3"/>
                                             </p:txEl>
@@ -23927,7 +24331,7 @@
                                       <p:cBhvr>
                                         <p:cTn id="52" dur="100"/>
                                         <p:tgtEl>
-                                          <p:spTgt spid="109">
+                                          <p:spTgt spid="112">
                                             <p:txEl>
                                               <p:pRg st="3" end="3"/>
                                             </p:txEl>
@@ -23970,7 +24374,7 @@
                                           </p:stCondLst>
                                         </p:cTn>
                                         <p:tgtEl>
-                                          <p:spTgt spid="109">
+                                          <p:spTgt spid="112">
                                             <p:txEl>
                                               <p:pRg st="4" end="4"/>
                                             </p:txEl>
@@ -23988,7 +24392,7 @@
                                       <p:cBhvr>
                                         <p:cTn id="57" dur="100"/>
                                         <p:tgtEl>
-                                          <p:spTgt spid="109">
+                                          <p:spTgt spid="112">
                                             <p:txEl>
                                               <p:pRg st="4" end="4"/>
                                             </p:txEl>

</xml_diff>